<commit_message>
revise flow diag again
</commit_message>
<xml_diff>
--- a/latex/popl2025/flow.pptx
+++ b/latex/popl2025/flow.pptx
@@ -2708,7 +2708,15 @@
           <a:p>
             <a:r>
               <a:rPr lang="en-US" dirty="0"/>
-              <a:t>Flick icon to add picture</a:t>
+              <a:t>Flick icon </a:t>
+            </a:r>
+            <a:r>
+              <a:rPr lang="en-US"/>
+              <a:t>to add </a:t>
+            </a:r>
+            <a:r>
+              <a:rPr lang="en-US" dirty="0"/>
+              <a:t>picture</a:t>
             </a:r>
           </a:p>
         </p:txBody>
@@ -2860,9 +2868,12 @@
 <p:sldMaster xmlns:a="http://schemas.openxmlformats.org/drawingml/2006/main" xmlns:r="http://schemas.openxmlformats.org/officeDocument/2006/relationships" xmlns:p="http://schemas.openxmlformats.org/presentationml/2006/main">
   <p:cSld>
     <p:bg>
-      <p:bgRef idx="1001">
-        <a:schemeClr val="bg1"/>
-      </p:bgRef>
+      <p:bgPr>
+        <a:solidFill>
+          <a:schemeClr val="bg1"/>
+        </a:solidFill>
+        <a:effectLst/>
+      </p:bgPr>
     </p:bg>
     <p:spTree>
       <p:nvGrpSpPr>
@@ -3441,7 +3452,7 @@
         </p:blipFill>
         <p:spPr>
           <a:xfrm>
-            <a:off x="21855098" y="1014686"/>
+            <a:off x="22766138" y="1126640"/>
             <a:ext cx="1768408" cy="5046686"/>
           </a:xfrm>
           <a:prstGeom prst="rect">
@@ -3477,7 +3488,7 @@
         </p:blipFill>
         <p:spPr>
           <a:xfrm rot="5400000">
-            <a:off x="24672801" y="2481492"/>
+            <a:off x="25583841" y="2484769"/>
             <a:ext cx="4971364" cy="1915842"/>
           </a:xfrm>
           <a:prstGeom prst="rect">
@@ -3501,7 +3512,7 @@
         </p:nvSpPr>
         <p:spPr>
           <a:xfrm>
-            <a:off x="4121108" y="4417926"/>
+            <a:off x="4725911" y="4442993"/>
             <a:ext cx="988106" cy="848504"/>
           </a:xfrm>
           <a:prstGeom prst="rect">
@@ -3587,7 +3598,7 @@
         </p:nvSpPr>
         <p:spPr>
           <a:xfrm>
-            <a:off x="4135038" y="5483388"/>
+            <a:off x="4738955" y="5500757"/>
             <a:ext cx="988106" cy="848504"/>
           </a:xfrm>
           <a:prstGeom prst="rect">
@@ -3675,8 +3686,8 @@
         </p:nvSpPr>
         <p:spPr>
           <a:xfrm>
-            <a:off x="1181201" y="397063"/>
-            <a:ext cx="12024552" cy="617623"/>
+            <a:off x="1300881" y="603894"/>
+            <a:ext cx="12396520" cy="437152"/>
           </a:xfrm>
         </p:spPr>
         <p:txBody>
@@ -3700,7 +3711,7 @@
                 <a:ea typeface="Linux Libertine" panose="02000503000000000000" pitchFamily="2" charset="0"/>
                 <a:cs typeface="Linux Libertine" panose="02000503000000000000" pitchFamily="2" charset="0"/>
               </a:rPr>
-              <a:t>                                     </a:t>
+              <a:t>                                          </a:t>
             </a:r>
             <a:r>
               <a:rPr lang="en-US" sz="4500" u="sng" dirty="0">
@@ -3708,7 +3719,7 @@
                 <a:ea typeface="Linux Libertine" panose="02000503000000000000" pitchFamily="2" charset="0"/>
                 <a:cs typeface="Linux Libertine" panose="02000503000000000000" pitchFamily="2" charset="0"/>
               </a:rPr>
-              <a:t>CNF Grammar       </a:t>
+              <a:t>CNF grammar       </a:t>
             </a:r>
           </a:p>
         </p:txBody>
@@ -3729,7 +3740,7 @@
         </p:nvSpPr>
         <p:spPr>
           <a:xfrm>
-            <a:off x="857202" y="1021750"/>
+            <a:off x="1124671" y="1068426"/>
             <a:ext cx="5846756" cy="1166946"/>
           </a:xfrm>
           <a:prstGeom prst="rect">
@@ -3792,8 +3803,8 @@
         </p:nvSpPr>
         <p:spPr>
           <a:xfrm>
-            <a:off x="1181201" y="3884823"/>
-            <a:ext cx="10940332" cy="753940"/>
+            <a:off x="1300881" y="3820432"/>
+            <a:ext cx="11631049" cy="753940"/>
           </a:xfrm>
           <a:prstGeom prst="rect">
             <a:avLst/>
@@ -3830,7 +3841,7 @@
                 <a:ea typeface="Linux Libertine" panose="02000503000000000000" pitchFamily="2" charset="0"/>
                 <a:cs typeface="Linux Libertine" panose="02000503000000000000" pitchFamily="2" charset="0"/>
               </a:rPr>
-              <a:t>Code</a:t>
+              <a:t>Code edits</a:t>
             </a:r>
             <a:r>
               <a:rPr lang="en-US" sz="4500" dirty="0">
@@ -3838,16 +3849,21 @@
                 <a:ea typeface="Linux Libertine" panose="02000503000000000000" pitchFamily="2" charset="0"/>
                 <a:cs typeface="Linux Libertine" panose="02000503000000000000" pitchFamily="2" charset="0"/>
               </a:rPr>
-              <a:t>                                        </a:t>
-            </a:r>
-            <a:r>
-              <a:rPr lang="en-US" sz="4500" u="sng" dirty="0">
+              <a:t>                                    </a:t>
+            </a:r>
+            <a:r>
+              <a:rPr lang="en-US" sz="4500" u="sng">
                 <a:latin typeface="Linux Libertine" panose="02000503000000000000" pitchFamily="2" charset="0"/>
                 <a:ea typeface="Linux Libertine" panose="02000503000000000000" pitchFamily="2" charset="0"/>
                 <a:cs typeface="Linux Libertine" panose="02000503000000000000" pitchFamily="2" charset="0"/>
               </a:rPr>
               <a:t>Edit automaton </a:t>
             </a:r>
+            <a:endParaRPr lang="en-US" sz="4500" u="sng" dirty="0">
+              <a:latin typeface="Linux Libertine" panose="02000503000000000000" pitchFamily="2" charset="0"/>
+              <a:ea typeface="Linux Libertine" panose="02000503000000000000" pitchFamily="2" charset="0"/>
+              <a:cs typeface="Linux Libertine" panose="02000503000000000000" pitchFamily="2" charset="0"/>
+            </a:endParaRPr>
           </a:p>
         </p:txBody>
       </p:sp>
@@ -3867,7 +3883,7 @@
         </p:nvSpPr>
         <p:spPr>
           <a:xfrm>
-            <a:off x="1255095" y="5114775"/>
+            <a:off x="1622673" y="5141669"/>
             <a:ext cx="1913919" cy="753939"/>
           </a:xfrm>
           <a:prstGeom prst="rect">
@@ -3934,7 +3950,7 @@
         </p:nvSpPr>
         <p:spPr>
           <a:xfrm rot="16200000">
-            <a:off x="2758004" y="5155816"/>
+            <a:off x="3361921" y="5182710"/>
             <a:ext cx="1806733" cy="710650"/>
           </a:xfrm>
           <a:prstGeom prst="trapezoid">
@@ -4000,188 +4016,6 @@
       </p:sp>
       <p:sp>
         <p:nvSpPr>
-          <p:cNvPr id="15" name="TextBox 14">
-            <a:extLst>
-              <a:ext uri="{FF2B5EF4-FFF2-40B4-BE49-F238E27FC236}">
-                <a16:creationId xmlns:a16="http://schemas.microsoft.com/office/drawing/2014/main" id="{17CA02CA-2DED-C5EA-24E3-258A71149E20}"/>
-              </a:ext>
-            </a:extLst>
-          </p:cNvPr>
-          <p:cNvSpPr txBox="1"/>
-          <p:nvPr/>
-        </p:nvSpPr>
-        <p:spPr>
-          <a:xfrm>
-            <a:off x="4090273" y="4492437"/>
-            <a:ext cx="1906486" cy="2139047"/>
-          </a:xfrm>
-          <a:prstGeom prst="rect">
-            <a:avLst/>
-          </a:prstGeom>
-          <a:noFill/>
-        </p:spPr>
-        <p:txBody>
-          <a:bodyPr wrap="square" rtlCol="0">
-            <a:spAutoFit/>
-          </a:bodyPr>
-          <a:lstStyle/>
-          <a:p>
-            <a:pPr>
-              <a:spcAft>
-                <a:spcPts val="600"/>
-              </a:spcAft>
-            </a:pPr>
-            <a:r>
-              <a:rPr lang="en-US" dirty="0">
-                <a:latin typeface="JetBrains Mono" panose="02000009000000000000" pitchFamily="49" charset="0"/>
-                <a:ea typeface="JetBrains Mono" panose="02000009000000000000" pitchFamily="49" charset="0"/>
-                <a:cs typeface="JetBrains Mono" panose="02000009000000000000" pitchFamily="49" charset="0"/>
-              </a:rPr>
-              <a:t> ( ) ( )  ✅</a:t>
-            </a:r>
-          </a:p>
-          <a:p>
-            <a:pPr>
-              <a:spcAft>
-                <a:spcPts val="600"/>
-              </a:spcAft>
-            </a:pPr>
-            <a:r>
-              <a:rPr lang="en-US" dirty="0">
-                <a:latin typeface="JetBrains Mono" panose="02000009000000000000" pitchFamily="49" charset="0"/>
-                <a:ea typeface="JetBrains Mono" panose="02000009000000000000" pitchFamily="49" charset="0"/>
-                <a:cs typeface="JetBrains Mono" panose="02000009000000000000" pitchFamily="49" charset="0"/>
-              </a:rPr>
-              <a:t> </a:t>
-            </a:r>
-            <a:r>
-              <a:rPr lang="en-US" dirty="0">
-                <a:solidFill>
-                  <a:srgbClr val="080808"/>
-                </a:solidFill>
-                <a:uFill>
-                  <a:solidFill>
-                    <a:srgbClr val="FF0000"/>
-                  </a:solidFill>
-                </a:uFill>
-                <a:latin typeface="JetBrains Mono" panose="02000009000000000000" pitchFamily="49" charset="0"/>
-              </a:rPr>
-              <a:t>) ) )</a:t>
-            </a:r>
-            <a:r>
-              <a:rPr lang="en-US" dirty="0">
-                <a:latin typeface="JetBrains Mono" panose="02000009000000000000" pitchFamily="49" charset="0"/>
-                <a:ea typeface="JetBrains Mono" panose="02000009000000000000" pitchFamily="49" charset="0"/>
-                <a:cs typeface="JetBrains Mono" panose="02000009000000000000" pitchFamily="49" charset="0"/>
-              </a:rPr>
-              <a:t>    ❌</a:t>
-            </a:r>
-            <a:r>
-              <a:rPr lang="en-US" dirty="0">
-                <a:solidFill>
-                  <a:srgbClr val="080808"/>
-                </a:solidFill>
-                <a:uFill>
-                  <a:solidFill>
-                    <a:srgbClr val="FF0000"/>
-                  </a:solidFill>
-                </a:uFill>
-                <a:latin typeface="JetBrains Mono" panose="02000009000000000000" pitchFamily="49" charset="0"/>
-              </a:rPr>
-              <a:t>  </a:t>
-            </a:r>
-            <a:endParaRPr lang="en-US" dirty="0">
-              <a:latin typeface="JetBrains Mono" panose="02000009000000000000" pitchFamily="49" charset="0"/>
-              <a:ea typeface="JetBrains Mono" panose="02000009000000000000" pitchFamily="49" charset="0"/>
-              <a:cs typeface="JetBrains Mono" panose="02000009000000000000" pitchFamily="49" charset="0"/>
-            </a:endParaRPr>
-          </a:p>
-          <a:p>
-            <a:pPr>
-              <a:spcAft>
-                <a:spcPts val="600"/>
-              </a:spcAft>
-            </a:pPr>
-            <a:r>
-              <a:rPr lang="en-US" dirty="0">
-                <a:latin typeface="JetBrains Mono" panose="02000009000000000000" pitchFamily="49" charset="0"/>
-                <a:ea typeface="JetBrains Mono" panose="02000009000000000000" pitchFamily="49" charset="0"/>
-                <a:cs typeface="JetBrains Mono" panose="02000009000000000000" pitchFamily="49" charset="0"/>
-              </a:rPr>
-              <a:t> ( ) )    ✅</a:t>
-            </a:r>
-          </a:p>
-          <a:p>
-            <a:pPr>
-              <a:spcAft>
-                <a:spcPts val="600"/>
-              </a:spcAft>
-            </a:pPr>
-            <a:r>
-              <a:rPr lang="en-US" dirty="0">
-                <a:latin typeface="JetBrains Mono" panose="02000009000000000000" pitchFamily="49" charset="0"/>
-                <a:ea typeface="JetBrains Mono" panose="02000009000000000000" pitchFamily="49" charset="0"/>
-                <a:cs typeface="JetBrains Mono" panose="02000009000000000000" pitchFamily="49" charset="0"/>
-              </a:rPr>
-              <a:t> ... </a:t>
-            </a:r>
-          </a:p>
-          <a:p>
-            <a:pPr>
-              <a:spcAft>
-                <a:spcPts val="600"/>
-              </a:spcAft>
-            </a:pPr>
-            <a:r>
-              <a:rPr lang="en-US" dirty="0">
-                <a:latin typeface="JetBrains Mono" panose="02000009000000000000" pitchFamily="49" charset="0"/>
-                <a:ea typeface="JetBrains Mono" panose="02000009000000000000" pitchFamily="49" charset="0"/>
-                <a:cs typeface="JetBrains Mono" panose="02000009000000000000" pitchFamily="49" charset="0"/>
-              </a:rPr>
-              <a:t> </a:t>
-            </a:r>
-            <a:r>
-              <a:rPr lang="en-US" dirty="0">
-                <a:solidFill>
-                  <a:srgbClr val="080808"/>
-                </a:solidFill>
-                <a:uFill>
-                  <a:solidFill>
-                    <a:srgbClr val="FF0000"/>
-                  </a:solidFill>
-                </a:uFill>
-                <a:latin typeface="JetBrains Mono" panose="02000009000000000000" pitchFamily="49" charset="0"/>
-              </a:rPr>
-              <a:t>( ( )</a:t>
-            </a:r>
-            <a:r>
-              <a:rPr lang="en-US" dirty="0">
-                <a:latin typeface="JetBrains Mono" panose="02000009000000000000" pitchFamily="49" charset="0"/>
-                <a:ea typeface="JetBrains Mono" panose="02000009000000000000" pitchFamily="49" charset="0"/>
-                <a:cs typeface="JetBrains Mono" panose="02000009000000000000" pitchFamily="49" charset="0"/>
-              </a:rPr>
-              <a:t>    ❌</a:t>
-            </a:r>
-          </a:p>
-          <a:p>
-            <a:pPr>
-              <a:spcAft>
-                <a:spcPts val="600"/>
-              </a:spcAft>
-            </a:pPr>
-            <a:r>
-              <a:rPr lang="en-US" dirty="0">
-                <a:latin typeface="JetBrains Mono" panose="02000009000000000000" pitchFamily="49" charset="0"/>
-                <a:ea typeface="JetBrains Mono" panose="02000009000000000000" pitchFamily="49" charset="0"/>
-                <a:cs typeface="JetBrains Mono" panose="02000009000000000000" pitchFamily="49" charset="0"/>
-              </a:rPr>
-              <a:t> ( ( ) )  ✅</a:t>
-            </a:r>
-          </a:p>
-        </p:txBody>
-      </p:sp>
-      <p:sp>
-        <p:nvSpPr>
           <p:cNvPr id="18" name="Rectangle 17">
             <a:extLst>
               <a:ext uri="{FF2B5EF4-FFF2-40B4-BE49-F238E27FC236}">
@@ -4194,7 +4028,7 @@
         </p:nvSpPr>
         <p:spPr>
           <a:xfrm>
-            <a:off x="5107186" y="4503452"/>
+            <a:off x="5446608" y="4530346"/>
             <a:ext cx="175925" cy="321296"/>
           </a:xfrm>
           <a:prstGeom prst="rect">
@@ -4248,7 +4082,7 @@
         </p:nvSpPr>
         <p:spPr>
           <a:xfrm>
-            <a:off x="4827062" y="5216995"/>
+            <a:off x="5438536" y="5235343"/>
             <a:ext cx="175925" cy="321296"/>
           </a:xfrm>
           <a:prstGeom prst="rect">
@@ -4302,7 +4136,7 @@
         </p:nvSpPr>
         <p:spPr>
           <a:xfrm>
-            <a:off x="4285985" y="4869432"/>
+            <a:off x="4889902" y="4870688"/>
             <a:ext cx="175925" cy="321296"/>
           </a:xfrm>
           <a:prstGeom prst="rect">
@@ -4356,7 +4190,7 @@
         </p:nvSpPr>
         <p:spPr>
           <a:xfrm>
-            <a:off x="4576022" y="5913372"/>
+            <a:off x="5179939" y="5930741"/>
             <a:ext cx="175925" cy="321296"/>
           </a:xfrm>
           <a:prstGeom prst="rect">
@@ -4410,7 +4244,7 @@
         </p:nvSpPr>
         <p:spPr>
           <a:xfrm>
-            <a:off x="6933013" y="5030080"/>
+            <a:off x="7499506" y="5021116"/>
             <a:ext cx="1167178" cy="923330"/>
           </a:xfrm>
           <a:prstGeom prst="rect">
@@ -4425,7 +4259,7 @@
           <a:lstStyle/>
           <a:p>
             <a:r>
-              <a:rPr lang="en-US" sz="5400" dirty="0">
+              <a:rPr lang="en-US" sz="5400" b="1" dirty="0">
                 <a:latin typeface="Linux Libertine" panose="02000503000000000000" pitchFamily="2" charset="0"/>
                 <a:ea typeface="Linux Libertine" panose="02000503000000000000" pitchFamily="2" charset="0"/>
                 <a:cs typeface="Linux Libertine" panose="02000503000000000000" pitchFamily="2" charset="0"/>
@@ -4449,7 +4283,7 @@
         </p:nvSpPr>
         <p:spPr>
           <a:xfrm>
-            <a:off x="6692514" y="1371814"/>
+            <a:off x="7181449" y="1398708"/>
             <a:ext cx="1001925" cy="923330"/>
           </a:xfrm>
           <a:prstGeom prst="rect">
@@ -4464,7 +4298,7 @@
           <a:lstStyle/>
           <a:p>
             <a:r>
-              <a:rPr lang="en-US" sz="5400" dirty="0">
+              <a:rPr lang="en-US" sz="5400" b="1" dirty="0">
                 <a:latin typeface="Linux Libertine" panose="02000503000000000000" pitchFamily="2" charset="0"/>
                 <a:ea typeface="Linux Libertine" panose="02000503000000000000" pitchFamily="2" charset="0"/>
                 <a:cs typeface="Linux Libertine" panose="02000503000000000000" pitchFamily="2" charset="0"/>
@@ -4490,7 +4324,7 @@
         </p:nvSpPr>
         <p:spPr>
           <a:xfrm>
-            <a:off x="8359585" y="1051408"/>
+            <a:off x="9069510" y="1078302"/>
             <a:ext cx="2406254" cy="1813026"/>
           </a:xfrm>
           <a:prstGeom prst="rect">
@@ -4567,7 +4401,7 @@
                 <a:ea typeface="Linux Libertine" panose="02000503000000000000" pitchFamily="2" charset="0"/>
                 <a:cs typeface="Linux Libertine" panose="02000503000000000000" pitchFamily="2" charset="0"/>
               </a:rPr>
-              <a:t>S → S S</a:t>
+              <a:t>L → (</a:t>
             </a:r>
             <a:endParaRPr lang="en-US" sz="4400" u="sng" dirty="0">
               <a:latin typeface="Linux Libertine" panose="02000503000000000000" pitchFamily="2" charset="0"/>
@@ -4593,7 +4427,7 @@
         </p:nvSpPr>
         <p:spPr>
           <a:xfrm>
-            <a:off x="10490296" y="931116"/>
+            <a:off x="11200221" y="958010"/>
             <a:ext cx="2497180" cy="1908615"/>
           </a:xfrm>
           <a:prstGeom prst="rect">
@@ -4642,7 +4476,7 @@
                 <a:ea typeface="Linux Libertine" panose="02000503000000000000" pitchFamily="2" charset="0"/>
                 <a:cs typeface="Linux Libertine" panose="02000503000000000000" pitchFamily="2" charset="0"/>
               </a:rPr>
-              <a:t>L → (</a:t>
+              <a:t>S → S S</a:t>
             </a:r>
             <a:endParaRPr lang="en-US" sz="4000" u="sng" dirty="0">
               <a:latin typeface="Linux Libertine" panose="02000503000000000000" pitchFamily="2" charset="0"/>
@@ -4681,8 +4515,8 @@
           <p:nvPr/>
         </p:nvSpPr>
         <p:spPr>
-          <a:xfrm rot="1859086">
-            <a:off x="13076031" y="2015291"/>
+          <a:xfrm rot="2404961">
+            <a:off x="13802095" y="2172990"/>
             <a:ext cx="978291" cy="923330"/>
           </a:xfrm>
           <a:prstGeom prst="rect">
@@ -4697,7 +4531,7 @@
           <a:lstStyle/>
           <a:p>
             <a:r>
-              <a:rPr lang="en-US" sz="5400" dirty="0">
+              <a:rPr lang="en-US" sz="5400" b="1" dirty="0">
                 <a:latin typeface="Linux Libertine" panose="02000503000000000000" pitchFamily="2" charset="0"/>
                 <a:ea typeface="Linux Libertine" panose="02000503000000000000" pitchFamily="2" charset="0"/>
                 <a:cs typeface="Linux Libertine" panose="02000503000000000000" pitchFamily="2" charset="0"/>
@@ -4720,8 +4554,8 @@
           <p:nvPr/>
         </p:nvSpPr>
         <p:spPr>
-          <a:xfrm rot="19458839">
-            <a:off x="13066441" y="4272361"/>
+          <a:xfrm rot="19374242">
+            <a:off x="13776366" y="4299255"/>
             <a:ext cx="978291" cy="923330"/>
           </a:xfrm>
           <a:prstGeom prst="rect">
@@ -4736,7 +4570,7 @@
           <a:lstStyle/>
           <a:p>
             <a:r>
-              <a:rPr lang="en-US" sz="5400" dirty="0">
+              <a:rPr lang="en-US" sz="5400" b="1" dirty="0">
                 <a:latin typeface="Linux Libertine" panose="02000503000000000000" pitchFamily="2" charset="0"/>
                 <a:ea typeface="Linux Libertine" panose="02000503000000000000" pitchFamily="2" charset="0"/>
                 <a:cs typeface="Linux Libertine" panose="02000503000000000000" pitchFamily="2" charset="0"/>
@@ -4762,8 +4596,8 @@
         </p:nvSpPr>
         <p:spPr>
           <a:xfrm>
-            <a:off x="15472697" y="723258"/>
-            <a:ext cx="3054695" cy="753940"/>
+            <a:off x="15751564" y="575713"/>
+            <a:ext cx="4054581" cy="753940"/>
           </a:xfrm>
           <a:prstGeom prst="rect">
             <a:avLst/>
@@ -4800,8 +4634,21 @@
                 <a:ea typeface="Linux Libertine" panose="02000503000000000000" pitchFamily="2" charset="0"/>
                 <a:cs typeface="Linux Libertine" panose="02000503000000000000" pitchFamily="2" charset="0"/>
               </a:rPr>
-              <a:t>∩-Grammar</a:t>
-            </a:r>
+              <a:t>CNF ∩</a:t>
+            </a:r>
+            <a:r>
+              <a:rPr lang="en-US" sz="4500" u="sng">
+                <a:latin typeface="Linux Libertine" panose="02000503000000000000" pitchFamily="2" charset="0"/>
+                <a:ea typeface="Linux Libertine" panose="02000503000000000000" pitchFamily="2" charset="0"/>
+                <a:cs typeface="Linux Libertine" panose="02000503000000000000" pitchFamily="2" charset="0"/>
+              </a:rPr>
+              <a:t>-grammar</a:t>
+            </a:r>
+            <a:endParaRPr lang="en-US" sz="4500" u="sng" dirty="0">
+              <a:latin typeface="Linux Libertine" panose="02000503000000000000" pitchFamily="2" charset="0"/>
+              <a:ea typeface="Linux Libertine" panose="02000503000000000000" pitchFamily="2" charset="0"/>
+              <a:cs typeface="Linux Libertine" panose="02000503000000000000" pitchFamily="2" charset="0"/>
+            </a:endParaRPr>
           </a:p>
         </p:txBody>
       </p:sp>
@@ -4821,7 +4668,7 @@
         </p:nvSpPr>
         <p:spPr>
           <a:xfrm>
-            <a:off x="15027092" y="2140748"/>
+            <a:off x="16163044" y="2094042"/>
             <a:ext cx="2419031" cy="1320632"/>
           </a:xfrm>
           <a:prstGeom prst="rect">
@@ -5344,7 +5191,7 @@
         </p:nvSpPr>
         <p:spPr>
           <a:xfrm>
-            <a:off x="14477201" y="4269088"/>
+            <a:off x="15327403" y="4422407"/>
             <a:ext cx="3284059" cy="1846202"/>
           </a:xfrm>
           <a:prstGeom prst="rect">
@@ -6416,10 +6263,10 @@
       </p:sp>
       <p:sp>
         <p:nvSpPr>
-          <p:cNvPr id="60" name="Title 1">
+          <p:cNvPr id="61" name="Title 1">
             <a:extLst>
               <a:ext uri="{FF2B5EF4-FFF2-40B4-BE49-F238E27FC236}">
-                <a16:creationId xmlns:a16="http://schemas.microsoft.com/office/drawing/2014/main" id="{7CA4D193-3998-3809-0938-4AFD3F336215}"/>
+                <a16:creationId xmlns:a16="http://schemas.microsoft.com/office/drawing/2014/main" id="{DB2A2720-A13A-A616-0889-8CD02F895A52}"/>
               </a:ext>
             </a:extLst>
           </p:cNvPr>
@@ -6430,8 +6277,8 @@
         </p:nvSpPr>
         <p:spPr>
           <a:xfrm>
-            <a:off x="17711990" y="3954414"/>
-            <a:ext cx="1195081" cy="1489156"/>
+            <a:off x="18324535" y="3975501"/>
+            <a:ext cx="2040560" cy="1475176"/>
           </a:xfrm>
           <a:prstGeom prst="rect">
             <a:avLst/>
@@ -6461,62 +6308,6 @@
             </a:lvl1pPr>
           </a:lstStyle>
           <a:p>
-            <a:endParaRPr lang="en-US" sz="1400" baseline="-25000" dirty="0">
-              <a:effectLst/>
-              <a:latin typeface="Linux Libertine" panose="02000503000000000000" pitchFamily="2" charset="0"/>
-              <a:ea typeface="Linux Libertine" panose="02000503000000000000" pitchFamily="2" charset="0"/>
-              <a:cs typeface="Linux Libertine" panose="02000503000000000000" pitchFamily="2" charset="0"/>
-            </a:endParaRPr>
-          </a:p>
-        </p:txBody>
-      </p:sp>
-      <p:sp>
-        <p:nvSpPr>
-          <p:cNvPr id="61" name="Title 1">
-            <a:extLst>
-              <a:ext uri="{FF2B5EF4-FFF2-40B4-BE49-F238E27FC236}">
-                <a16:creationId xmlns:a16="http://schemas.microsoft.com/office/drawing/2014/main" id="{DB2A2720-A13A-A616-0889-8CD02F895A52}"/>
-              </a:ext>
-            </a:extLst>
-          </p:cNvPr>
-          <p:cNvSpPr txBox="1">
-            <a:spLocks/>
-          </p:cNvSpPr>
-          <p:nvPr/>
-        </p:nvSpPr>
-        <p:spPr>
-          <a:xfrm>
-            <a:off x="17531483" y="4022207"/>
-            <a:ext cx="2040560" cy="1475176"/>
-          </a:xfrm>
-          <a:prstGeom prst="rect">
-            <a:avLst/>
-          </a:prstGeom>
-        </p:spPr>
-        <p:txBody>
-          <a:bodyPr vert="horz" lIns="91440" tIns="45720" rIns="91440" bIns="45720" rtlCol="0" anchor="b">
-            <a:noAutofit/>
-          </a:bodyPr>
-          <a:lstStyle>
-            <a:lvl1pPr algn="ctr" defTabSz="914400" rtl="0" eaLnBrk="1" latinLnBrk="0" hangingPunct="1">
-              <a:lnSpc>
-                <a:spcPct val="90000"/>
-              </a:lnSpc>
-              <a:spcBef>
-                <a:spcPct val="0"/>
-              </a:spcBef>
-              <a:buNone/>
-              <a:defRPr sz="6000" kern="1200">
-                <a:solidFill>
-                  <a:schemeClr val="tx1"/>
-                </a:solidFill>
-                <a:latin typeface="+mj-lt"/>
-                <a:ea typeface="+mj-ea"/>
-                <a:cs typeface="+mj-cs"/>
-              </a:defRPr>
-            </a:lvl1pPr>
-          </a:lstStyle>
-          <a:p>
             <a:br>
               <a:rPr lang="en-US" sz="2000" dirty="0">
                 <a:effectLst/>
@@ -6550,7 +6341,7 @@
                 <a:ea typeface="Linux Libertine" panose="02000503000000000000" pitchFamily="2" charset="0"/>
                 <a:cs typeface="Linux Libertine" panose="02000503000000000000" pitchFamily="2" charset="0"/>
               </a:rPr>
-              <a:t>Bq</a:t>
+              <a:t>Rq</a:t>
             </a:r>
             <a:r>
               <a:rPr lang="en-US" sz="2000" baseline="-25000" dirty="0">
@@ -6603,7 +6394,7 @@
                 <a:ea typeface="Linux Libertine" panose="02000503000000000000" pitchFamily="2" charset="0"/>
                 <a:cs typeface="Linux Libertine" panose="02000503000000000000" pitchFamily="2" charset="0"/>
               </a:rPr>
-              <a:t>Bq</a:t>
+              <a:t>Rq</a:t>
             </a:r>
             <a:r>
               <a:rPr lang="en-US" sz="2000" baseline="-25000" dirty="0">
@@ -6656,7 +6447,7 @@
                 <a:ea typeface="Linux Libertine" panose="02000503000000000000" pitchFamily="2" charset="0"/>
                 <a:cs typeface="Linux Libertine" panose="02000503000000000000" pitchFamily="2" charset="0"/>
               </a:rPr>
-              <a:t>Aq</a:t>
+              <a:t>Lq</a:t>
             </a:r>
             <a:r>
               <a:rPr lang="en-US" sz="2000" baseline="-25000" dirty="0">
@@ -6709,7 +6500,7 @@
                 <a:ea typeface="Linux Libertine" panose="02000503000000000000" pitchFamily="2" charset="0"/>
                 <a:cs typeface="Linux Libertine" panose="02000503000000000000" pitchFamily="2" charset="0"/>
               </a:rPr>
-              <a:t>Aq</a:t>
+              <a:t>Lq</a:t>
             </a:r>
             <a:r>
               <a:rPr lang="en-US" sz="2000" baseline="-25000" dirty="0">
@@ -6762,7 +6553,7 @@
                 <a:ea typeface="Linux Libertine" panose="02000503000000000000" pitchFamily="2" charset="0"/>
                 <a:cs typeface="Linux Libertine" panose="02000503000000000000" pitchFamily="2" charset="0"/>
               </a:rPr>
-              <a:t>Bq</a:t>
+              <a:t>Rq</a:t>
             </a:r>
             <a:r>
               <a:rPr lang="en-US" sz="2000" baseline="-25000" dirty="0">
@@ -6815,7 +6606,7 @@
                 <a:ea typeface="Linux Libertine" panose="02000503000000000000" pitchFamily="2" charset="0"/>
                 <a:cs typeface="Linux Libertine" panose="02000503000000000000" pitchFamily="2" charset="0"/>
               </a:rPr>
-              <a:t>Bq</a:t>
+              <a:t>Rq</a:t>
             </a:r>
             <a:r>
               <a:rPr lang="en-US" sz="2000" baseline="-25000" dirty="0">
@@ -6868,7 +6659,7 @@
                 <a:ea typeface="Linux Libertine" panose="02000503000000000000" pitchFamily="2" charset="0"/>
                 <a:cs typeface="Linux Libertine" panose="02000503000000000000" pitchFamily="2" charset="0"/>
               </a:rPr>
-              <a:t>Bq</a:t>
+              <a:t>Rq</a:t>
             </a:r>
             <a:r>
               <a:rPr lang="en-US" sz="2000" baseline="-25000" dirty="0">
@@ -6921,7 +6712,7 @@
                 <a:ea typeface="Linux Libertine" panose="02000503000000000000" pitchFamily="2" charset="0"/>
                 <a:cs typeface="Linux Libertine" panose="02000503000000000000" pitchFamily="2" charset="0"/>
               </a:rPr>
-              <a:t>Bq</a:t>
+              <a:t>Rq</a:t>
             </a:r>
             <a:r>
               <a:rPr lang="en-US" sz="2000" baseline="-25000" dirty="0">
@@ -6974,7 +6765,7 @@
                 <a:ea typeface="Linux Libertine" panose="02000503000000000000" pitchFamily="2" charset="0"/>
                 <a:cs typeface="Linux Libertine" panose="02000503000000000000" pitchFamily="2" charset="0"/>
               </a:rPr>
-              <a:t>Aq</a:t>
+              <a:t>Lq</a:t>
             </a:r>
             <a:r>
               <a:rPr lang="en-US" sz="2000" baseline="-25000" dirty="0">
@@ -7027,7 +6818,7 @@
                 <a:ea typeface="Linux Libertine" panose="02000503000000000000" pitchFamily="2" charset="0"/>
                 <a:cs typeface="Linux Libertine" panose="02000503000000000000" pitchFamily="2" charset="0"/>
               </a:rPr>
-              <a:t>Aq</a:t>
+              <a:t>Lq</a:t>
             </a:r>
             <a:r>
               <a:rPr lang="en-US" sz="2000" baseline="-25000" dirty="0">
@@ -7080,7 +6871,7 @@
                 <a:ea typeface="Linux Libertine" panose="02000503000000000000" pitchFamily="2" charset="0"/>
                 <a:cs typeface="Linux Libertine" panose="02000503000000000000" pitchFamily="2" charset="0"/>
               </a:rPr>
-              <a:t>Bq</a:t>
+              <a:t>Rq</a:t>
             </a:r>
             <a:r>
               <a:rPr lang="en-US" sz="2000" baseline="-25000" dirty="0">
@@ -7133,7 +6924,7 @@
                 <a:ea typeface="Linux Libertine" panose="02000503000000000000" pitchFamily="2" charset="0"/>
                 <a:cs typeface="Linux Libertine" panose="02000503000000000000" pitchFamily="2" charset="0"/>
               </a:rPr>
-              <a:t>Bq</a:t>
+              <a:t>Rq</a:t>
             </a:r>
             <a:r>
               <a:rPr lang="en-US" sz="2000" baseline="-25000" dirty="0">
@@ -7170,7 +6961,7 @@
         </p:nvSpPr>
         <p:spPr>
           <a:xfrm>
-            <a:off x="20054984" y="3077566"/>
+            <a:off x="20966024" y="3104460"/>
             <a:ext cx="1024760" cy="923330"/>
           </a:xfrm>
           <a:prstGeom prst="rect">
@@ -7185,7 +6976,7 @@
           <a:lstStyle/>
           <a:p>
             <a:r>
-              <a:rPr lang="en-US" sz="5400" dirty="0">
+              <a:rPr lang="en-US" sz="5400" b="1" dirty="0">
                 <a:latin typeface="Linux Libertine" panose="02000503000000000000" pitchFamily="2" charset="0"/>
                 <a:ea typeface="Linux Libertine" panose="02000503000000000000" pitchFamily="2" charset="0"/>
                 <a:cs typeface="Linux Libertine" panose="02000503000000000000" pitchFamily="2" charset="0"/>
@@ -7211,7 +7002,7 @@
         </p:nvSpPr>
         <p:spPr>
           <a:xfrm>
-            <a:off x="26579377" y="547683"/>
+            <a:off x="27490417" y="568227"/>
             <a:ext cx="1521354" cy="753940"/>
           </a:xfrm>
           <a:prstGeom prst="rect">
@@ -7276,7 +7067,7 @@
         </p:nvSpPr>
         <p:spPr>
           <a:xfrm>
-            <a:off x="26754328" y="2634925"/>
+            <a:off x="27665368" y="2661819"/>
             <a:ext cx="322524" cy="369332"/>
           </a:xfrm>
           <a:prstGeom prst="rect">
@@ -7315,7 +7106,7 @@
         </p:nvSpPr>
         <p:spPr>
           <a:xfrm>
-            <a:off x="26537556" y="3254747"/>
+            <a:off x="27448596" y="3281641"/>
             <a:ext cx="322524" cy="369332"/>
           </a:xfrm>
           <a:prstGeom prst="rect">
@@ -7354,7 +7145,7 @@
         </p:nvSpPr>
         <p:spPr>
           <a:xfrm>
-            <a:off x="27445658" y="3239781"/>
+            <a:off x="28356698" y="3266675"/>
             <a:ext cx="322524" cy="369332"/>
           </a:xfrm>
           <a:prstGeom prst="rect">
@@ -7393,7 +7184,7 @@
         </p:nvSpPr>
         <p:spPr>
           <a:xfrm>
-            <a:off x="27521228" y="4374276"/>
+            <a:off x="28432268" y="4401170"/>
             <a:ext cx="322524" cy="369332"/>
           </a:xfrm>
           <a:prstGeom prst="rect">
@@ -7432,7 +7223,7 @@
         </p:nvSpPr>
         <p:spPr>
           <a:xfrm>
-            <a:off x="26471147" y="4374276"/>
+            <a:off x="27382187" y="4401170"/>
             <a:ext cx="322524" cy="369332"/>
           </a:xfrm>
           <a:prstGeom prst="rect">
@@ -7471,7 +7262,7 @@
         </p:nvSpPr>
         <p:spPr>
           <a:xfrm>
-            <a:off x="27203965" y="5007523"/>
+            <a:off x="28115005" y="5034417"/>
             <a:ext cx="322524" cy="369332"/>
           </a:xfrm>
           <a:prstGeom prst="rect">
@@ -7510,7 +7301,7 @@
         </p:nvSpPr>
         <p:spPr>
           <a:xfrm>
-            <a:off x="28846332" y="2999715"/>
+            <a:off x="29757372" y="3116017"/>
             <a:ext cx="1024760" cy="923330"/>
           </a:xfrm>
           <a:prstGeom prst="rect">
@@ -7525,7 +7316,7 @@
           <a:lstStyle/>
           <a:p>
             <a:r>
-              <a:rPr lang="en-US" sz="5400" dirty="0">
+              <a:rPr lang="en-US" sz="5400" b="1" dirty="0">
                 <a:latin typeface="Linux Libertine" panose="02000503000000000000" pitchFamily="2" charset="0"/>
                 <a:ea typeface="Linux Libertine" panose="02000503000000000000" pitchFamily="2" charset="0"/>
                 <a:cs typeface="Linux Libertine" panose="02000503000000000000" pitchFamily="2" charset="0"/>
@@ -7551,7 +7342,7 @@
         </p:nvSpPr>
         <p:spPr>
           <a:xfrm>
-            <a:off x="22109996" y="543859"/>
+            <a:off x="23021036" y="570753"/>
             <a:ext cx="1521354" cy="753940"/>
           </a:xfrm>
           <a:prstGeom prst="rect">
@@ -7589,7 +7380,7 @@
                 <a:ea typeface="Linux Libertine" panose="02000503000000000000" pitchFamily="2" charset="0"/>
                 <a:cs typeface="Linux Libertine" panose="02000503000000000000" pitchFamily="2" charset="0"/>
               </a:rPr>
-              <a:t>DFA</a:t>
+              <a:t>NFA</a:t>
             </a:r>
           </a:p>
         </p:txBody>
@@ -7608,7 +7399,7 @@
         </p:nvSpPr>
         <p:spPr>
           <a:xfrm>
-            <a:off x="24441093" y="3090146"/>
+            <a:off x="25352133" y="3117040"/>
             <a:ext cx="1024760" cy="923330"/>
           </a:xfrm>
           <a:prstGeom prst="rect">
@@ -7623,7 +7414,7 @@
           <a:lstStyle/>
           <a:p>
             <a:r>
-              <a:rPr lang="en-US" sz="5400" dirty="0">
+              <a:rPr lang="en-US" sz="5400" b="1" dirty="0">
                 <a:latin typeface="Linux Libertine" panose="02000503000000000000" pitchFamily="2" charset="0"/>
                 <a:ea typeface="Linux Libertine" panose="02000503000000000000" pitchFamily="2" charset="0"/>
                 <a:cs typeface="Linux Libertine" panose="02000503000000000000" pitchFamily="2" charset="0"/>
@@ -7649,7 +7440,7 @@
         </p:nvSpPr>
         <p:spPr>
           <a:xfrm>
-            <a:off x="31007817" y="2270012"/>
+            <a:off x="31800869" y="2296906"/>
             <a:ext cx="4198926" cy="3507456"/>
           </a:xfrm>
           <a:prstGeom prst="rect">
@@ -7792,7 +7583,7 @@
         </p:nvSpPr>
         <p:spPr>
           <a:xfrm>
-            <a:off x="30383348" y="1248243"/>
+            <a:off x="31176400" y="1275137"/>
             <a:ext cx="4511161" cy="1046901"/>
           </a:xfrm>
           <a:prstGeom prst="rect">
@@ -7829,13 +7620,18 @@
               </a:spcAft>
             </a:pPr>
             <a:r>
-              <a:rPr lang="en-US" sz="4500" u="sng" dirty="0">
-                <a:latin typeface="Linux Libertine" panose="02000503000000000000" pitchFamily="2" charset="0"/>
-                <a:ea typeface="Linux Libertine" panose="02000503000000000000" pitchFamily="2" charset="0"/>
-                <a:cs typeface="Linux Libertine" panose="02000503000000000000" pitchFamily="2" charset="0"/>
-              </a:rPr>
-              <a:t>Decoded Repairs</a:t>
-            </a:r>
+              <a:rPr lang="en-US" sz="4500" u="sng">
+                <a:latin typeface="Linux Libertine" panose="02000503000000000000" pitchFamily="2" charset="0"/>
+                <a:ea typeface="Linux Libertine" panose="02000503000000000000" pitchFamily="2" charset="0"/>
+                <a:cs typeface="Linux Libertine" panose="02000503000000000000" pitchFamily="2" charset="0"/>
+              </a:rPr>
+              <a:t>Decoded repairs</a:t>
+            </a:r>
+            <a:endParaRPr lang="en-US" sz="4500" u="sng" dirty="0">
+              <a:latin typeface="Linux Libertine" panose="02000503000000000000" pitchFamily="2" charset="0"/>
+              <a:ea typeface="Linux Libertine" panose="02000503000000000000" pitchFamily="2" charset="0"/>
+              <a:cs typeface="Linux Libertine" panose="02000503000000000000" pitchFamily="2" charset="0"/>
+            </a:endParaRPr>
           </a:p>
         </p:txBody>
       </p:sp>
@@ -7853,7 +7649,7 @@
         </p:nvSpPr>
         <p:spPr>
           <a:xfrm rot="5400000">
-            <a:off x="5418980" y="5155816"/>
+            <a:off x="5662680" y="5182710"/>
             <a:ext cx="1806733" cy="710650"/>
           </a:xfrm>
           <a:prstGeom prst="trapezoid">
@@ -7939,7 +7735,7 @@
         </p:blipFill>
         <p:spPr>
           <a:xfrm>
-            <a:off x="8660933" y="4856269"/>
+            <a:off x="9187978" y="4716909"/>
             <a:ext cx="4395724" cy="1756603"/>
           </a:xfrm>
           <a:prstGeom prst="rect">
@@ -7947,6 +7743,242 @@
           </a:prstGeom>
         </p:spPr>
       </p:pic>
+      <p:sp>
+        <p:nvSpPr>
+          <p:cNvPr id="12" name="Rectangle 11">
+            <a:extLst>
+              <a:ext uri="{FF2B5EF4-FFF2-40B4-BE49-F238E27FC236}">
+                <a16:creationId xmlns:a16="http://schemas.microsoft.com/office/drawing/2014/main" id="{FBFDFA99-9782-28ED-5C06-09EDB0624792}"/>
+              </a:ext>
+            </a:extLst>
+          </p:cNvPr>
+          <p:cNvSpPr/>
+          <p:nvPr/>
+        </p:nvSpPr>
+        <p:spPr>
+          <a:xfrm>
+            <a:off x="4906797" y="6297902"/>
+            <a:ext cx="175925" cy="321296"/>
+          </a:xfrm>
+          <a:prstGeom prst="rect">
+            <a:avLst/>
+          </a:prstGeom>
+          <a:solidFill>
+            <a:srgbClr val="00FF00">
+              <a:alpha val="29804"/>
+            </a:srgbClr>
+          </a:solidFill>
+          <a:ln>
+            <a:noFill/>
+          </a:ln>
+        </p:spPr>
+        <p:style>
+          <a:lnRef idx="2">
+            <a:schemeClr val="accent1">
+              <a:shade val="15000"/>
+            </a:schemeClr>
+          </a:lnRef>
+          <a:fillRef idx="1">
+            <a:schemeClr val="accent1"/>
+          </a:fillRef>
+          <a:effectRef idx="0">
+            <a:schemeClr val="accent1"/>
+          </a:effectRef>
+          <a:fontRef idx="minor">
+            <a:schemeClr val="lt1"/>
+          </a:fontRef>
+        </p:style>
+        <p:txBody>
+          <a:bodyPr rtlCol="0" anchor="ctr"/>
+          <a:lstStyle/>
+          <a:p>
+            <a:pPr algn="ctr"/>
+            <a:endParaRPr lang="en-US"/>
+          </a:p>
+        </p:txBody>
+      </p:sp>
+      <p:sp>
+        <p:nvSpPr>
+          <p:cNvPr id="15" name="TextBox 14">
+            <a:extLst>
+              <a:ext uri="{FF2B5EF4-FFF2-40B4-BE49-F238E27FC236}">
+                <a16:creationId xmlns:a16="http://schemas.microsoft.com/office/drawing/2014/main" id="{17CA02CA-2DED-C5EA-24E3-258A71149E20}"/>
+              </a:ext>
+            </a:extLst>
+          </p:cNvPr>
+          <p:cNvSpPr txBox="1"/>
+          <p:nvPr/>
+        </p:nvSpPr>
+        <p:spPr>
+          <a:xfrm>
+            <a:off x="4694190" y="4519331"/>
+            <a:ext cx="1906486" cy="2139047"/>
+          </a:xfrm>
+          <a:prstGeom prst="rect">
+            <a:avLst/>
+          </a:prstGeom>
+          <a:noFill/>
+        </p:spPr>
+        <p:txBody>
+          <a:bodyPr wrap="square" rtlCol="0">
+            <a:spAutoFit/>
+          </a:bodyPr>
+          <a:lstStyle/>
+          <a:p>
+            <a:pPr>
+              <a:spcAft>
+                <a:spcPts val="600"/>
+              </a:spcAft>
+            </a:pPr>
+            <a:r>
+              <a:rPr lang="en-US" dirty="0">
+                <a:latin typeface="JetBrains Mono" panose="02000009000000000000" pitchFamily="49" charset="0"/>
+                <a:ea typeface="JetBrains Mono" panose="02000009000000000000" pitchFamily="49" charset="0"/>
+                <a:cs typeface="JetBrains Mono" panose="02000009000000000000" pitchFamily="49" charset="0"/>
+              </a:rPr>
+              <a:t> ( ) ( )</a:t>
+            </a:r>
+          </a:p>
+          <a:p>
+            <a:pPr>
+              <a:spcAft>
+                <a:spcPts val="600"/>
+              </a:spcAft>
+            </a:pPr>
+            <a:r>
+              <a:rPr lang="en-US" dirty="0">
+                <a:latin typeface="JetBrains Mono" panose="02000009000000000000" pitchFamily="49" charset="0"/>
+                <a:ea typeface="JetBrains Mono" panose="02000009000000000000" pitchFamily="49" charset="0"/>
+                <a:cs typeface="JetBrains Mono" panose="02000009000000000000" pitchFamily="49" charset="0"/>
+              </a:rPr>
+              <a:t> </a:t>
+            </a:r>
+            <a:r>
+              <a:rPr lang="en-US" dirty="0">
+                <a:solidFill>
+                  <a:srgbClr val="080808"/>
+                </a:solidFill>
+                <a:uFill>
+                  <a:solidFill>
+                    <a:srgbClr val="FF0000"/>
+                  </a:solidFill>
+                </a:uFill>
+                <a:latin typeface="JetBrains Mono" panose="02000009000000000000" pitchFamily="49" charset="0"/>
+              </a:rPr>
+              <a:t>) ) )</a:t>
+            </a:r>
+            <a:r>
+              <a:rPr lang="en-US" dirty="0">
+                <a:latin typeface="JetBrains Mono" panose="02000009000000000000" pitchFamily="49" charset="0"/>
+                <a:ea typeface="JetBrains Mono" panose="02000009000000000000" pitchFamily="49" charset="0"/>
+                <a:cs typeface="JetBrains Mono" panose="02000009000000000000" pitchFamily="49" charset="0"/>
+              </a:rPr>
+              <a:t>    </a:t>
+            </a:r>
+            <a:r>
+              <a:rPr lang="en-US" dirty="0">
+                <a:solidFill>
+                  <a:srgbClr val="080808"/>
+                </a:solidFill>
+                <a:uFill>
+                  <a:solidFill>
+                    <a:srgbClr val="FF0000"/>
+                  </a:solidFill>
+                </a:uFill>
+                <a:latin typeface="JetBrains Mono" panose="02000009000000000000" pitchFamily="49" charset="0"/>
+              </a:rPr>
+              <a:t>  </a:t>
+            </a:r>
+            <a:endParaRPr lang="en-US" dirty="0">
+              <a:latin typeface="JetBrains Mono" panose="02000009000000000000" pitchFamily="49" charset="0"/>
+              <a:ea typeface="JetBrains Mono" panose="02000009000000000000" pitchFamily="49" charset="0"/>
+              <a:cs typeface="JetBrains Mono" panose="02000009000000000000" pitchFamily="49" charset="0"/>
+            </a:endParaRPr>
+          </a:p>
+          <a:p>
+            <a:pPr>
+              <a:spcAft>
+                <a:spcPts val="600"/>
+              </a:spcAft>
+            </a:pPr>
+            <a:r>
+              <a:rPr lang="en-US" dirty="0">
+                <a:latin typeface="JetBrains Mono" panose="02000009000000000000" pitchFamily="49" charset="0"/>
+                <a:ea typeface="JetBrains Mono" panose="02000009000000000000" pitchFamily="49" charset="0"/>
+                <a:cs typeface="JetBrains Mono" panose="02000009000000000000" pitchFamily="49" charset="0"/>
+              </a:rPr>
+              <a:t> ( ) )    </a:t>
+            </a:r>
+          </a:p>
+          <a:p>
+            <a:pPr>
+              <a:spcAft>
+                <a:spcPts val="600"/>
+              </a:spcAft>
+            </a:pPr>
+            <a:r>
+              <a:rPr lang="en-US" dirty="0">
+                <a:latin typeface="JetBrains Mono" panose="02000009000000000000" pitchFamily="49" charset="0"/>
+                <a:ea typeface="JetBrains Mono" panose="02000009000000000000" pitchFamily="49" charset="0"/>
+                <a:cs typeface="JetBrains Mono" panose="02000009000000000000" pitchFamily="49" charset="0"/>
+              </a:rPr>
+              <a:t> ... </a:t>
+            </a:r>
+          </a:p>
+          <a:p>
+            <a:pPr>
+              <a:spcAft>
+                <a:spcPts val="600"/>
+              </a:spcAft>
+            </a:pPr>
+            <a:r>
+              <a:rPr lang="en-US" dirty="0">
+                <a:latin typeface="JetBrains Mono" panose="02000009000000000000" pitchFamily="49" charset="0"/>
+                <a:ea typeface="JetBrains Mono" panose="02000009000000000000" pitchFamily="49" charset="0"/>
+                <a:cs typeface="JetBrains Mono" panose="02000009000000000000" pitchFamily="49" charset="0"/>
+              </a:rPr>
+              <a:t> </a:t>
+            </a:r>
+            <a:r>
+              <a:rPr lang="en-US" dirty="0">
+                <a:solidFill>
+                  <a:srgbClr val="080808"/>
+                </a:solidFill>
+                <a:uFill>
+                  <a:solidFill>
+                    <a:srgbClr val="FF0000"/>
+                  </a:solidFill>
+                </a:uFill>
+                <a:latin typeface="JetBrains Mono" panose="02000009000000000000" pitchFamily="49" charset="0"/>
+              </a:rPr>
+              <a:t>( ( )</a:t>
+            </a:r>
+            <a:r>
+              <a:rPr lang="en-US" dirty="0">
+                <a:latin typeface="JetBrains Mono" panose="02000009000000000000" pitchFamily="49" charset="0"/>
+                <a:ea typeface="JetBrains Mono" panose="02000009000000000000" pitchFamily="49" charset="0"/>
+                <a:cs typeface="JetBrains Mono" panose="02000009000000000000" pitchFamily="49" charset="0"/>
+              </a:rPr>
+              <a:t>    </a:t>
+            </a:r>
+          </a:p>
+          <a:p>
+            <a:pPr>
+              <a:spcAft>
+                <a:spcPts val="600"/>
+              </a:spcAft>
+            </a:pPr>
+            <a:r>
+              <a:rPr lang="en-US" dirty="0">
+                <a:latin typeface="JetBrains Mono" panose="02000009000000000000" pitchFamily="49" charset="0"/>
+                <a:ea typeface="JetBrains Mono" panose="02000009000000000000" pitchFamily="49" charset="0"/>
+                <a:cs typeface="JetBrains Mono" panose="02000009000000000000" pitchFamily="49" charset="0"/>
+              </a:rPr>
+              <a:t> ( ( ) )  </a:t>
+            </a:r>
+          </a:p>
+        </p:txBody>
+      </p:sp>
     </p:spTree>
     <p:extLst>
       <p:ext uri="{BB962C8B-B14F-4D97-AF65-F5344CB8AC3E}">

</xml_diff>

<commit_message>
add ranking component to fig. 1 per xujie's request
</commit_message>
<xml_diff>
--- a/latex/popl2025/flow.pptx
+++ b/latex/popl2025/flow.pptx
@@ -3452,7 +3452,7 @@
         </p:blipFill>
         <p:spPr>
           <a:xfrm>
-            <a:off x="22766138" y="1126640"/>
+            <a:off x="19847156" y="1126640"/>
             <a:ext cx="1768408" cy="5046686"/>
           </a:xfrm>
           <a:prstGeom prst="rect">
@@ -3488,7 +3488,7 @@
         </p:blipFill>
         <p:spPr>
           <a:xfrm rot="5400000">
-            <a:off x="25583841" y="2484769"/>
+            <a:off x="22345239" y="2484769"/>
             <a:ext cx="4971364" cy="1915842"/>
           </a:xfrm>
           <a:prstGeom prst="rect">
@@ -3512,7 +3512,7 @@
         </p:nvSpPr>
         <p:spPr>
           <a:xfrm>
-            <a:off x="4725911" y="4442993"/>
+            <a:off x="3451297" y="4442993"/>
             <a:ext cx="988106" cy="848504"/>
           </a:xfrm>
           <a:prstGeom prst="rect">
@@ -3598,7 +3598,7 @@
         </p:nvSpPr>
         <p:spPr>
           <a:xfrm>
-            <a:off x="4738955" y="5500757"/>
+            <a:off x="3464341" y="5500757"/>
             <a:ext cx="988106" cy="848504"/>
           </a:xfrm>
           <a:prstGeom prst="rect">
@@ -3686,7 +3686,7 @@
         </p:nvSpPr>
         <p:spPr>
           <a:xfrm>
-            <a:off x="1300881" y="603894"/>
+            <a:off x="26267" y="603894"/>
             <a:ext cx="12396520" cy="437152"/>
           </a:xfrm>
         </p:spPr>
@@ -3711,7 +3711,7 @@
                 <a:ea typeface="Linux Libertine" panose="02000503000000000000" pitchFamily="2" charset="0"/>
                 <a:cs typeface="Linux Libertine" panose="02000503000000000000" pitchFamily="2" charset="0"/>
               </a:rPr>
-              <a:t>                                          </a:t>
+              <a:t>                                       </a:t>
             </a:r>
             <a:r>
               <a:rPr lang="en-US" sz="4500" u="sng" dirty="0">
@@ -3740,7 +3740,7 @@
         </p:nvSpPr>
         <p:spPr>
           <a:xfrm>
-            <a:off x="1124671" y="1068426"/>
+            <a:off x="-149943" y="1068426"/>
             <a:ext cx="5846756" cy="1166946"/>
           </a:xfrm>
           <a:prstGeom prst="rect">
@@ -3803,7 +3803,7 @@
         </p:nvSpPr>
         <p:spPr>
           <a:xfrm>
-            <a:off x="1300881" y="3820432"/>
+            <a:off x="26267" y="3820432"/>
             <a:ext cx="11631049" cy="753940"/>
           </a:xfrm>
           <a:prstGeom prst="rect">
@@ -3849,21 +3849,16 @@
                 <a:ea typeface="Linux Libertine" panose="02000503000000000000" pitchFamily="2" charset="0"/>
                 <a:cs typeface="Linux Libertine" panose="02000503000000000000" pitchFamily="2" charset="0"/>
               </a:rPr>
-              <a:t>                                    </a:t>
-            </a:r>
-            <a:r>
-              <a:rPr lang="en-US" sz="4500" u="sng">
+              <a:t>                                 </a:t>
+            </a:r>
+            <a:r>
+              <a:rPr lang="en-US" sz="4500" u="sng" dirty="0">
                 <a:latin typeface="Linux Libertine" panose="02000503000000000000" pitchFamily="2" charset="0"/>
                 <a:ea typeface="Linux Libertine" panose="02000503000000000000" pitchFamily="2" charset="0"/>
                 <a:cs typeface="Linux Libertine" panose="02000503000000000000" pitchFamily="2" charset="0"/>
               </a:rPr>
               <a:t>Edit automaton </a:t>
             </a:r>
-            <a:endParaRPr lang="en-US" sz="4500" u="sng" dirty="0">
-              <a:latin typeface="Linux Libertine" panose="02000503000000000000" pitchFamily="2" charset="0"/>
-              <a:ea typeface="Linux Libertine" panose="02000503000000000000" pitchFamily="2" charset="0"/>
-              <a:cs typeface="Linux Libertine" panose="02000503000000000000" pitchFamily="2" charset="0"/>
-            </a:endParaRPr>
           </a:p>
         </p:txBody>
       </p:sp>
@@ -3883,7 +3878,7 @@
         </p:nvSpPr>
         <p:spPr>
           <a:xfrm>
-            <a:off x="1622673" y="5141669"/>
+            <a:off x="348059" y="5141669"/>
             <a:ext cx="1913919" cy="753939"/>
           </a:xfrm>
           <a:prstGeom prst="rect">
@@ -3950,7 +3945,7 @@
         </p:nvSpPr>
         <p:spPr>
           <a:xfrm rot="16200000">
-            <a:off x="3361921" y="5182710"/>
+            <a:off x="2087307" y="5182710"/>
             <a:ext cx="1806733" cy="710650"/>
           </a:xfrm>
           <a:prstGeom prst="trapezoid">
@@ -4028,7 +4023,7 @@
         </p:nvSpPr>
         <p:spPr>
           <a:xfrm>
-            <a:off x="5446608" y="4530346"/>
+            <a:off x="4171994" y="4530346"/>
             <a:ext cx="175925" cy="321296"/>
           </a:xfrm>
           <a:prstGeom prst="rect">
@@ -4082,7 +4077,7 @@
         </p:nvSpPr>
         <p:spPr>
           <a:xfrm>
-            <a:off x="5438536" y="5235343"/>
+            <a:off x="4163922" y="5235343"/>
             <a:ext cx="175925" cy="321296"/>
           </a:xfrm>
           <a:prstGeom prst="rect">
@@ -4136,7 +4131,7 @@
         </p:nvSpPr>
         <p:spPr>
           <a:xfrm>
-            <a:off x="4889902" y="4870688"/>
+            <a:off x="3615288" y="4870688"/>
             <a:ext cx="175925" cy="321296"/>
           </a:xfrm>
           <a:prstGeom prst="rect">
@@ -4190,7 +4185,7 @@
         </p:nvSpPr>
         <p:spPr>
           <a:xfrm>
-            <a:off x="5179939" y="5930741"/>
+            <a:off x="3905325" y="5930741"/>
             <a:ext cx="175925" cy="321296"/>
           </a:xfrm>
           <a:prstGeom prst="rect">
@@ -4244,7 +4239,7 @@
         </p:nvSpPr>
         <p:spPr>
           <a:xfrm>
-            <a:off x="7499506" y="5021116"/>
+            <a:off x="5947802" y="5021116"/>
             <a:ext cx="1167178" cy="923330"/>
           </a:xfrm>
           <a:prstGeom prst="rect">
@@ -4283,7 +4278,7 @@
         </p:nvSpPr>
         <p:spPr>
           <a:xfrm>
-            <a:off x="7181449" y="1398708"/>
+            <a:off x="5629745" y="1398708"/>
             <a:ext cx="1001925" cy="923330"/>
           </a:xfrm>
           <a:prstGeom prst="rect">
@@ -4324,7 +4319,7 @@
         </p:nvSpPr>
         <p:spPr>
           <a:xfrm>
-            <a:off x="9069510" y="1078302"/>
+            <a:off x="7517806" y="1078302"/>
             <a:ext cx="2406254" cy="1813026"/>
           </a:xfrm>
           <a:prstGeom prst="rect">
@@ -4427,7 +4422,7 @@
         </p:nvSpPr>
         <p:spPr>
           <a:xfrm>
-            <a:off x="11200221" y="958010"/>
+            <a:off x="9648517" y="958010"/>
             <a:ext cx="2497180" cy="1908615"/>
           </a:xfrm>
           <a:prstGeom prst="rect">
@@ -4516,7 +4511,7 @@
         </p:nvSpPr>
         <p:spPr>
           <a:xfrm rot="2404961">
-            <a:off x="13802095" y="2172990"/>
+            <a:off x="11973301" y="2172990"/>
             <a:ext cx="978291" cy="923330"/>
           </a:xfrm>
           <a:prstGeom prst="rect">
@@ -4555,7 +4550,7 @@
         </p:nvSpPr>
         <p:spPr>
           <a:xfrm rot="19374242">
-            <a:off x="13776366" y="4299255"/>
+            <a:off x="11947572" y="4299255"/>
             <a:ext cx="978291" cy="923330"/>
           </a:xfrm>
           <a:prstGeom prst="rect">
@@ -4596,7 +4591,7 @@
         </p:nvSpPr>
         <p:spPr>
           <a:xfrm>
-            <a:off x="15751564" y="575713"/>
+            <a:off x="13593231" y="575713"/>
             <a:ext cx="4054581" cy="753940"/>
           </a:xfrm>
           <a:prstGeom prst="rect">
@@ -4668,7 +4663,7 @@
         </p:nvSpPr>
         <p:spPr>
           <a:xfrm>
-            <a:off x="16163044" y="2094042"/>
+            <a:off x="14004711" y="2094042"/>
             <a:ext cx="2419031" cy="1320632"/>
           </a:xfrm>
           <a:prstGeom prst="rect">
@@ -5191,7 +5186,7 @@
         </p:nvSpPr>
         <p:spPr>
           <a:xfrm>
-            <a:off x="15327403" y="4422407"/>
+            <a:off x="13169070" y="4422407"/>
             <a:ext cx="3284059" cy="1846202"/>
           </a:xfrm>
           <a:prstGeom prst="rect">
@@ -6277,7 +6272,7 @@
         </p:nvSpPr>
         <p:spPr>
           <a:xfrm>
-            <a:off x="18324535" y="3975501"/>
+            <a:off x="16166202" y="3975501"/>
             <a:ext cx="2040560" cy="1475176"/>
           </a:xfrm>
           <a:prstGeom prst="rect">
@@ -6961,7 +6956,7 @@
         </p:nvSpPr>
         <p:spPr>
           <a:xfrm>
-            <a:off x="20966024" y="3104460"/>
+            <a:off x="18360154" y="3104460"/>
             <a:ext cx="1024760" cy="923330"/>
           </a:xfrm>
           <a:prstGeom prst="rect">
@@ -7002,7 +6997,7 @@
         </p:nvSpPr>
         <p:spPr>
           <a:xfrm>
-            <a:off x="27490417" y="568227"/>
+            <a:off x="24251815" y="568227"/>
             <a:ext cx="1521354" cy="753940"/>
           </a:xfrm>
           <a:prstGeom prst="rect">
@@ -7067,7 +7062,7 @@
         </p:nvSpPr>
         <p:spPr>
           <a:xfrm>
-            <a:off x="27665368" y="2661819"/>
+            <a:off x="24426766" y="2661819"/>
             <a:ext cx="322524" cy="369332"/>
           </a:xfrm>
           <a:prstGeom prst="rect">
@@ -7106,7 +7101,7 @@
         </p:nvSpPr>
         <p:spPr>
           <a:xfrm>
-            <a:off x="27448596" y="3281641"/>
+            <a:off x="24209994" y="3281641"/>
             <a:ext cx="322524" cy="369332"/>
           </a:xfrm>
           <a:prstGeom prst="rect">
@@ -7145,7 +7140,7 @@
         </p:nvSpPr>
         <p:spPr>
           <a:xfrm>
-            <a:off x="28356698" y="3266675"/>
+            <a:off x="25118096" y="3266675"/>
             <a:ext cx="322524" cy="369332"/>
           </a:xfrm>
           <a:prstGeom prst="rect">
@@ -7184,7 +7179,7 @@
         </p:nvSpPr>
         <p:spPr>
           <a:xfrm>
-            <a:off x="28432268" y="4401170"/>
+            <a:off x="25193666" y="4401170"/>
             <a:ext cx="322524" cy="369332"/>
           </a:xfrm>
           <a:prstGeom prst="rect">
@@ -7223,7 +7218,7 @@
         </p:nvSpPr>
         <p:spPr>
           <a:xfrm>
-            <a:off x="27382187" y="4401170"/>
+            <a:off x="24143585" y="4401170"/>
             <a:ext cx="322524" cy="369332"/>
           </a:xfrm>
           <a:prstGeom prst="rect">
@@ -7262,7 +7257,7 @@
         </p:nvSpPr>
         <p:spPr>
           <a:xfrm>
-            <a:off x="28115005" y="5034417"/>
+            <a:off x="24876403" y="5034417"/>
             <a:ext cx="322524" cy="369332"/>
           </a:xfrm>
           <a:prstGeom prst="rect">
@@ -7301,7 +7296,7 @@
         </p:nvSpPr>
         <p:spPr>
           <a:xfrm>
-            <a:off x="29757372" y="3116017"/>
+            <a:off x="31040303" y="3116017"/>
             <a:ext cx="1024760" cy="923330"/>
           </a:xfrm>
           <a:prstGeom prst="rect">
@@ -7342,7 +7337,7 @@
         </p:nvSpPr>
         <p:spPr>
           <a:xfrm>
-            <a:off x="23021036" y="570753"/>
+            <a:off x="20102054" y="570753"/>
             <a:ext cx="1521354" cy="753940"/>
           </a:xfrm>
           <a:prstGeom prst="rect">
@@ -7399,7 +7394,7 @@
         </p:nvSpPr>
         <p:spPr>
           <a:xfrm>
-            <a:off x="25352133" y="3117040"/>
+            <a:off x="22252076" y="3117040"/>
             <a:ext cx="1024760" cy="923330"/>
           </a:xfrm>
           <a:prstGeom prst="rect">
@@ -7440,7 +7435,7 @@
         </p:nvSpPr>
         <p:spPr>
           <a:xfrm>
-            <a:off x="31800869" y="2296906"/>
+            <a:off x="32992360" y="2296906"/>
             <a:ext cx="4198926" cy="3507456"/>
           </a:xfrm>
           <a:prstGeom prst="rect">
@@ -7583,7 +7578,7 @@
         </p:nvSpPr>
         <p:spPr>
           <a:xfrm>
-            <a:off x="31176400" y="1275137"/>
+            <a:off x="32367891" y="1275137"/>
             <a:ext cx="4511161" cy="1046901"/>
           </a:xfrm>
           <a:prstGeom prst="rect">
@@ -7620,18 +7615,13 @@
               </a:spcAft>
             </a:pPr>
             <a:r>
-              <a:rPr lang="en-US" sz="4500" u="sng">
-                <a:latin typeface="Linux Libertine" panose="02000503000000000000" pitchFamily="2" charset="0"/>
-                <a:ea typeface="Linux Libertine" panose="02000503000000000000" pitchFamily="2" charset="0"/>
-                <a:cs typeface="Linux Libertine" panose="02000503000000000000" pitchFamily="2" charset="0"/>
-              </a:rPr>
-              <a:t>Decoded repairs</a:t>
-            </a:r>
-            <a:endParaRPr lang="en-US" sz="4500" u="sng" dirty="0">
-              <a:latin typeface="Linux Libertine" panose="02000503000000000000" pitchFamily="2" charset="0"/>
-              <a:ea typeface="Linux Libertine" panose="02000503000000000000" pitchFamily="2" charset="0"/>
-              <a:cs typeface="Linux Libertine" panose="02000503000000000000" pitchFamily="2" charset="0"/>
-            </a:endParaRPr>
+              <a:rPr lang="en-US" sz="4500" u="sng" dirty="0">
+                <a:latin typeface="Linux Libertine" panose="02000503000000000000" pitchFamily="2" charset="0"/>
+                <a:ea typeface="Linux Libertine" panose="02000503000000000000" pitchFamily="2" charset="0"/>
+                <a:cs typeface="Linux Libertine" panose="02000503000000000000" pitchFamily="2" charset="0"/>
+              </a:rPr>
+              <a:t>Ranked repairs</a:t>
+            </a:r>
           </a:p>
         </p:txBody>
       </p:sp>
@@ -7649,7 +7639,7 @@
         </p:nvSpPr>
         <p:spPr>
           <a:xfrm rot="5400000">
-            <a:off x="5662680" y="5182710"/>
+            <a:off x="4388066" y="5182710"/>
             <a:ext cx="1806733" cy="710650"/>
           </a:xfrm>
           <a:prstGeom prst="trapezoid">
@@ -7735,7 +7725,7 @@
         </p:blipFill>
         <p:spPr>
           <a:xfrm>
-            <a:off x="9187978" y="4716909"/>
+            <a:off x="7636274" y="4716909"/>
             <a:ext cx="4395724" cy="1756603"/>
           </a:xfrm>
           <a:prstGeom prst="rect">
@@ -7757,7 +7747,7 @@
         </p:nvSpPr>
         <p:spPr>
           <a:xfrm>
-            <a:off x="4906797" y="6297902"/>
+            <a:off x="3632183" y="6297902"/>
             <a:ext cx="175925" cy="321296"/>
           </a:xfrm>
           <a:prstGeom prst="rect">
@@ -7811,7 +7801,7 @@
         </p:nvSpPr>
         <p:spPr>
           <a:xfrm>
-            <a:off x="4694190" y="4519331"/>
+            <a:off x="3419576" y="4519331"/>
             <a:ext cx="1906486" cy="2139047"/>
           </a:xfrm>
           <a:prstGeom prst="rect">
@@ -7976,6 +7966,694 @@
               </a:rPr>
               <a:t> ( ( ) )  </a:t>
             </a:r>
+          </a:p>
+        </p:txBody>
+      </p:sp>
+      <p:pic>
+        <p:nvPicPr>
+          <p:cNvPr id="25" name="Graphic 24">
+            <a:extLst>
+              <a:ext uri="{FF2B5EF4-FFF2-40B4-BE49-F238E27FC236}">
+                <a16:creationId xmlns:a16="http://schemas.microsoft.com/office/drawing/2014/main" id="{5B2938E1-AEE5-B013-10B2-486FD7C6B1D3}"/>
+              </a:ext>
+            </a:extLst>
+          </p:cNvPr>
+          <p:cNvPicPr>
+            <a:picLocks noChangeAspect="1"/>
+          </p:cNvPicPr>
+          <p:nvPr/>
+        </p:nvPicPr>
+        <p:blipFill>
+          <a:blip r:embed="rId5">
+            <a:extLst>
+              <a:ext uri="{96DAC541-7B7A-43D3-8B79-37D633B846F1}">
+                <asvg:svgBlip xmlns:asvg="http://schemas.microsoft.com/office/drawing/2016/SVG/main" r:embed="rId6"/>
+              </a:ext>
+            </a:extLst>
+          </a:blip>
+          <a:stretch>
+            <a:fillRect/>
+          </a:stretch>
+        </p:blipFill>
+        <p:spPr>
+          <a:xfrm rot="5400000">
+            <a:off x="26554750" y="2452005"/>
+            <a:ext cx="4971364" cy="1915842"/>
+          </a:xfrm>
+          <a:prstGeom prst="rect">
+            <a:avLst/>
+          </a:prstGeom>
+        </p:spPr>
+      </p:pic>
+      <p:sp>
+        <p:nvSpPr>
+          <p:cNvPr id="27" name="TextBox 26">
+            <a:extLst>
+              <a:ext uri="{FF2B5EF4-FFF2-40B4-BE49-F238E27FC236}">
+                <a16:creationId xmlns:a16="http://schemas.microsoft.com/office/drawing/2014/main" id="{184DEDF2-107C-1F87-6F90-86A71DA99B3D}"/>
+              </a:ext>
+            </a:extLst>
+          </p:cNvPr>
+          <p:cNvSpPr txBox="1"/>
+          <p:nvPr/>
+        </p:nvSpPr>
+        <p:spPr>
+          <a:xfrm>
+            <a:off x="28636277" y="2629055"/>
+            <a:ext cx="322524" cy="369332"/>
+          </a:xfrm>
+          <a:prstGeom prst="rect">
+            <a:avLst/>
+          </a:prstGeom>
+          <a:noFill/>
+        </p:spPr>
+        <p:txBody>
+          <a:bodyPr wrap="none" rtlCol="0">
+            <a:spAutoFit/>
+          </a:bodyPr>
+          <a:lstStyle/>
+          <a:p>
+            <a:r>
+              <a:rPr lang="en-US" dirty="0">
+                <a:latin typeface="JetBrains Mono" panose="02000009000000000000" pitchFamily="49" charset="0"/>
+                <a:ea typeface="JetBrains Mono" panose="02000009000000000000" pitchFamily="49" charset="0"/>
+                <a:cs typeface="JetBrains Mono" panose="02000009000000000000" pitchFamily="49" charset="0"/>
+              </a:rPr>
+              <a:t>(</a:t>
+            </a:r>
+          </a:p>
+        </p:txBody>
+      </p:sp>
+      <p:sp>
+        <p:nvSpPr>
+          <p:cNvPr id="28" name="TextBox 27">
+            <a:extLst>
+              <a:ext uri="{FF2B5EF4-FFF2-40B4-BE49-F238E27FC236}">
+                <a16:creationId xmlns:a16="http://schemas.microsoft.com/office/drawing/2014/main" id="{99344865-F611-2574-907D-0E1B9E2652C6}"/>
+              </a:ext>
+            </a:extLst>
+          </p:cNvPr>
+          <p:cNvSpPr txBox="1"/>
+          <p:nvPr/>
+        </p:nvSpPr>
+        <p:spPr>
+          <a:xfrm>
+            <a:off x="28419505" y="3248877"/>
+            <a:ext cx="322524" cy="369332"/>
+          </a:xfrm>
+          <a:prstGeom prst="rect">
+            <a:avLst/>
+          </a:prstGeom>
+          <a:noFill/>
+        </p:spPr>
+        <p:txBody>
+          <a:bodyPr wrap="none" rtlCol="0">
+            <a:spAutoFit/>
+          </a:bodyPr>
+          <a:lstStyle/>
+          <a:p>
+            <a:r>
+              <a:rPr lang="en-US" dirty="0">
+                <a:latin typeface="JetBrains Mono" panose="02000009000000000000" pitchFamily="49" charset="0"/>
+                <a:ea typeface="JetBrains Mono" panose="02000009000000000000" pitchFamily="49" charset="0"/>
+                <a:cs typeface="JetBrains Mono" panose="02000009000000000000" pitchFamily="49" charset="0"/>
+              </a:rPr>
+              <a:t>)</a:t>
+            </a:r>
+          </a:p>
+        </p:txBody>
+      </p:sp>
+      <p:sp>
+        <p:nvSpPr>
+          <p:cNvPr id="29" name="TextBox 28">
+            <a:extLst>
+              <a:ext uri="{FF2B5EF4-FFF2-40B4-BE49-F238E27FC236}">
+                <a16:creationId xmlns:a16="http://schemas.microsoft.com/office/drawing/2014/main" id="{97D7C696-58A6-D896-FC68-244E5A2350A8}"/>
+              </a:ext>
+            </a:extLst>
+          </p:cNvPr>
+          <p:cNvSpPr txBox="1"/>
+          <p:nvPr/>
+        </p:nvSpPr>
+        <p:spPr>
+          <a:xfrm>
+            <a:off x="29327607" y="3233911"/>
+            <a:ext cx="322524" cy="369332"/>
+          </a:xfrm>
+          <a:prstGeom prst="rect">
+            <a:avLst/>
+          </a:prstGeom>
+          <a:noFill/>
+        </p:spPr>
+        <p:txBody>
+          <a:bodyPr wrap="none" rtlCol="0">
+            <a:spAutoFit/>
+          </a:bodyPr>
+          <a:lstStyle/>
+          <a:p>
+            <a:r>
+              <a:rPr lang="en-US" dirty="0">
+                <a:latin typeface="JetBrains Mono" panose="02000009000000000000" pitchFamily="49" charset="0"/>
+                <a:ea typeface="JetBrains Mono" panose="02000009000000000000" pitchFamily="49" charset="0"/>
+                <a:cs typeface="JetBrains Mono" panose="02000009000000000000" pitchFamily="49" charset="0"/>
+              </a:rPr>
+              <a:t>(</a:t>
+            </a:r>
+          </a:p>
+        </p:txBody>
+      </p:sp>
+      <p:sp>
+        <p:nvSpPr>
+          <p:cNvPr id="30" name="TextBox 29">
+            <a:extLst>
+              <a:ext uri="{FF2B5EF4-FFF2-40B4-BE49-F238E27FC236}">
+                <a16:creationId xmlns:a16="http://schemas.microsoft.com/office/drawing/2014/main" id="{5D4F92A0-DF43-2D3C-351E-FBBB86B6A456}"/>
+              </a:ext>
+            </a:extLst>
+          </p:cNvPr>
+          <p:cNvSpPr txBox="1"/>
+          <p:nvPr/>
+        </p:nvSpPr>
+        <p:spPr>
+          <a:xfrm>
+            <a:off x="29403177" y="4368406"/>
+            <a:ext cx="322524" cy="369332"/>
+          </a:xfrm>
+          <a:prstGeom prst="rect">
+            <a:avLst/>
+          </a:prstGeom>
+          <a:noFill/>
+        </p:spPr>
+        <p:txBody>
+          <a:bodyPr wrap="none" rtlCol="0">
+            <a:spAutoFit/>
+          </a:bodyPr>
+          <a:lstStyle/>
+          <a:p>
+            <a:r>
+              <a:rPr lang="en-US" dirty="0">
+                <a:latin typeface="JetBrains Mono" panose="02000009000000000000" pitchFamily="49" charset="0"/>
+                <a:ea typeface="JetBrains Mono" panose="02000009000000000000" pitchFamily="49" charset="0"/>
+                <a:cs typeface="JetBrains Mono" panose="02000009000000000000" pitchFamily="49" charset="0"/>
+              </a:rPr>
+              <a:t>)</a:t>
+            </a:r>
+          </a:p>
+        </p:txBody>
+      </p:sp>
+      <p:sp>
+        <p:nvSpPr>
+          <p:cNvPr id="31" name="TextBox 30">
+            <a:extLst>
+              <a:ext uri="{FF2B5EF4-FFF2-40B4-BE49-F238E27FC236}">
+                <a16:creationId xmlns:a16="http://schemas.microsoft.com/office/drawing/2014/main" id="{A0592A84-3A3D-F5E7-410E-608E00B72059}"/>
+              </a:ext>
+            </a:extLst>
+          </p:cNvPr>
+          <p:cNvSpPr txBox="1"/>
+          <p:nvPr/>
+        </p:nvSpPr>
+        <p:spPr>
+          <a:xfrm>
+            <a:off x="28353096" y="4368406"/>
+            <a:ext cx="322524" cy="369332"/>
+          </a:xfrm>
+          <a:prstGeom prst="rect">
+            <a:avLst/>
+          </a:prstGeom>
+          <a:noFill/>
+        </p:spPr>
+        <p:txBody>
+          <a:bodyPr wrap="none" rtlCol="0">
+            <a:spAutoFit/>
+          </a:bodyPr>
+          <a:lstStyle/>
+          <a:p>
+            <a:r>
+              <a:rPr lang="en-US" dirty="0">
+                <a:latin typeface="JetBrains Mono" panose="02000009000000000000" pitchFamily="49" charset="0"/>
+                <a:ea typeface="JetBrains Mono" panose="02000009000000000000" pitchFamily="49" charset="0"/>
+                <a:cs typeface="JetBrains Mono" panose="02000009000000000000" pitchFamily="49" charset="0"/>
+              </a:rPr>
+              <a:t>(</a:t>
+            </a:r>
+          </a:p>
+        </p:txBody>
+      </p:sp>
+      <p:sp>
+        <p:nvSpPr>
+          <p:cNvPr id="32" name="TextBox 31">
+            <a:extLst>
+              <a:ext uri="{FF2B5EF4-FFF2-40B4-BE49-F238E27FC236}">
+                <a16:creationId xmlns:a16="http://schemas.microsoft.com/office/drawing/2014/main" id="{40B9EF60-6640-7950-132B-B2961DDCFC72}"/>
+              </a:ext>
+            </a:extLst>
+          </p:cNvPr>
+          <p:cNvSpPr txBox="1"/>
+          <p:nvPr/>
+        </p:nvSpPr>
+        <p:spPr>
+          <a:xfrm>
+            <a:off x="29085914" y="5001653"/>
+            <a:ext cx="322524" cy="369332"/>
+          </a:xfrm>
+          <a:prstGeom prst="rect">
+            <a:avLst/>
+          </a:prstGeom>
+          <a:noFill/>
+        </p:spPr>
+        <p:txBody>
+          <a:bodyPr wrap="none" rtlCol="0">
+            <a:spAutoFit/>
+          </a:bodyPr>
+          <a:lstStyle/>
+          <a:p>
+            <a:r>
+              <a:rPr lang="en-US" dirty="0">
+                <a:latin typeface="JetBrains Mono" panose="02000009000000000000" pitchFamily="49" charset="0"/>
+                <a:ea typeface="JetBrains Mono" panose="02000009000000000000" pitchFamily="49" charset="0"/>
+                <a:cs typeface="JetBrains Mono" panose="02000009000000000000" pitchFamily="49" charset="0"/>
+              </a:rPr>
+              <a:t>)</a:t>
+            </a:r>
+          </a:p>
+        </p:txBody>
+      </p:sp>
+      <p:sp>
+        <p:nvSpPr>
+          <p:cNvPr id="33" name="TextBox 32">
+            <a:extLst>
+              <a:ext uri="{FF2B5EF4-FFF2-40B4-BE49-F238E27FC236}">
+                <a16:creationId xmlns:a16="http://schemas.microsoft.com/office/drawing/2014/main" id="{221EAE10-6F36-951E-8E2A-F64A63DAFDE1}"/>
+              </a:ext>
+            </a:extLst>
+          </p:cNvPr>
+          <p:cNvSpPr txBox="1"/>
+          <p:nvPr/>
+        </p:nvSpPr>
+        <p:spPr>
+          <a:xfrm>
+            <a:off x="26132641" y="3104460"/>
+            <a:ext cx="1024760" cy="923330"/>
+          </a:xfrm>
+          <a:prstGeom prst="rect">
+            <a:avLst/>
+          </a:prstGeom>
+          <a:noFill/>
+        </p:spPr>
+        <p:txBody>
+          <a:bodyPr wrap="square">
+            <a:spAutoFit/>
+          </a:bodyPr>
+          <a:lstStyle/>
+          <a:p>
+            <a:r>
+              <a:rPr lang="en-US" sz="5400" b="1" dirty="0">
+                <a:latin typeface="Linux Libertine" panose="02000503000000000000" pitchFamily="2" charset="0"/>
+                <a:ea typeface="Linux Libertine" panose="02000503000000000000" pitchFamily="2" charset="0"/>
+                <a:cs typeface="Linux Libertine" panose="02000503000000000000" pitchFamily="2" charset="0"/>
+              </a:rPr>
+              <a:t>⟶</a:t>
+            </a:r>
+          </a:p>
+        </p:txBody>
+      </p:sp>
+      <p:sp>
+        <p:nvSpPr>
+          <p:cNvPr id="34" name="Title 1">
+            <a:extLst>
+              <a:ext uri="{FF2B5EF4-FFF2-40B4-BE49-F238E27FC236}">
+                <a16:creationId xmlns:a16="http://schemas.microsoft.com/office/drawing/2014/main" id="{E0B7A8A2-23EE-39F6-32DB-8911EC7C070C}"/>
+              </a:ext>
+            </a:extLst>
+          </p:cNvPr>
+          <p:cNvSpPr txBox="1">
+            <a:spLocks/>
+          </p:cNvSpPr>
+          <p:nvPr/>
+        </p:nvSpPr>
+        <p:spPr>
+          <a:xfrm>
+            <a:off x="27967123" y="582625"/>
+            <a:ext cx="2195788" cy="753940"/>
+          </a:xfrm>
+          <a:prstGeom prst="rect">
+            <a:avLst/>
+          </a:prstGeom>
+        </p:spPr>
+        <p:txBody>
+          <a:bodyPr vert="horz" lIns="91440" tIns="45720" rIns="91440" bIns="45720" rtlCol="0" anchor="b">
+            <a:normAutofit/>
+          </a:bodyPr>
+          <a:lstStyle>
+            <a:lvl1pPr algn="ctr" defTabSz="914400" rtl="0" eaLnBrk="1" latinLnBrk="0" hangingPunct="1">
+              <a:lnSpc>
+                <a:spcPct val="90000"/>
+              </a:lnSpc>
+              <a:spcBef>
+                <a:spcPct val="0"/>
+              </a:spcBef>
+              <a:buNone/>
+              <a:defRPr sz="6000" kern="1200">
+                <a:solidFill>
+                  <a:schemeClr val="tx1"/>
+                </a:solidFill>
+                <a:latin typeface="+mj-lt"/>
+                <a:ea typeface="+mj-ea"/>
+                <a:cs typeface="+mj-cs"/>
+              </a:defRPr>
+            </a:lvl1pPr>
+          </a:lstStyle>
+          <a:p>
+            <a:r>
+              <a:rPr lang="en-US" sz="4500" u="sng" dirty="0">
+                <a:latin typeface="Linux Libertine" panose="02000503000000000000" pitchFamily="2" charset="0"/>
+                <a:ea typeface="Linux Libertine" panose="02000503000000000000" pitchFamily="2" charset="0"/>
+                <a:cs typeface="Linux Libertine" panose="02000503000000000000" pitchFamily="2" charset="0"/>
+              </a:rPr>
+              <a:t>Decoder</a:t>
+            </a:r>
+            <a:endParaRPr lang="en-US" sz="4500" dirty="0">
+              <a:latin typeface="Linux Libertine" panose="02000503000000000000" pitchFamily="2" charset="0"/>
+              <a:ea typeface="Linux Libertine" panose="02000503000000000000" pitchFamily="2" charset="0"/>
+              <a:cs typeface="Linux Libertine" panose="02000503000000000000" pitchFamily="2" charset="0"/>
+            </a:endParaRPr>
+          </a:p>
+        </p:txBody>
+      </p:sp>
+      <p:sp>
+        <p:nvSpPr>
+          <p:cNvPr id="55" name="Freeform 54">
+            <a:extLst>
+              <a:ext uri="{FF2B5EF4-FFF2-40B4-BE49-F238E27FC236}">
+                <a16:creationId xmlns:a16="http://schemas.microsoft.com/office/drawing/2014/main" id="{E5CD06CE-22DE-7085-F2F9-6668BAC8806D}"/>
+              </a:ext>
+            </a:extLst>
+          </p:cNvPr>
+          <p:cNvSpPr/>
+          <p:nvPr/>
+        </p:nvSpPr>
+        <p:spPr>
+          <a:xfrm>
+            <a:off x="27533407" y="1650188"/>
+            <a:ext cx="997627" cy="4128655"/>
+          </a:xfrm>
+          <a:custGeom>
+            <a:avLst/>
+            <a:gdLst>
+              <a:gd name="connsiteX0" fmla="*/ 720536 w 997627"/>
+              <a:gd name="connsiteY0" fmla="*/ 0 h 4128655"/>
+              <a:gd name="connsiteX1" fmla="*/ 748245 w 997627"/>
+              <a:gd name="connsiteY1" fmla="*/ 1468582 h 4128655"/>
+              <a:gd name="connsiteX2" fmla="*/ 99 w 997627"/>
+              <a:gd name="connsiteY2" fmla="*/ 2355273 h 4128655"/>
+              <a:gd name="connsiteX3" fmla="*/ 803663 w 997627"/>
+              <a:gd name="connsiteY3" fmla="*/ 3269673 h 4128655"/>
+              <a:gd name="connsiteX4" fmla="*/ 997627 w 997627"/>
+              <a:gd name="connsiteY4" fmla="*/ 4128655 h 4128655"/>
+            </a:gdLst>
+            <a:ahLst/>
+            <a:cxnLst>
+              <a:cxn ang="0">
+                <a:pos x="connsiteX0" y="connsiteY0"/>
+              </a:cxn>
+              <a:cxn ang="0">
+                <a:pos x="connsiteX1" y="connsiteY1"/>
+              </a:cxn>
+              <a:cxn ang="0">
+                <a:pos x="connsiteX2" y="connsiteY2"/>
+              </a:cxn>
+              <a:cxn ang="0">
+                <a:pos x="connsiteX3" y="connsiteY3"/>
+              </a:cxn>
+              <a:cxn ang="0">
+                <a:pos x="connsiteX4" y="connsiteY4"/>
+              </a:cxn>
+            </a:cxnLst>
+            <a:rect l="l" t="t" r="r" b="b"/>
+            <a:pathLst>
+              <a:path w="997627" h="4128655">
+                <a:moveTo>
+                  <a:pt x="720536" y="0"/>
+                </a:moveTo>
+                <a:cubicBezTo>
+                  <a:pt x="794427" y="538018"/>
+                  <a:pt x="868318" y="1076037"/>
+                  <a:pt x="748245" y="1468582"/>
+                </a:cubicBezTo>
+                <a:cubicBezTo>
+                  <a:pt x="628172" y="1861128"/>
+                  <a:pt x="-9137" y="2055091"/>
+                  <a:pt x="99" y="2355273"/>
+                </a:cubicBezTo>
+                <a:cubicBezTo>
+                  <a:pt x="9335" y="2655455"/>
+                  <a:pt x="637408" y="2974109"/>
+                  <a:pt x="803663" y="3269673"/>
+                </a:cubicBezTo>
+                <a:cubicBezTo>
+                  <a:pt x="969918" y="3565237"/>
+                  <a:pt x="993009" y="3874655"/>
+                  <a:pt x="997627" y="4128655"/>
+                </a:cubicBezTo>
+              </a:path>
+            </a:pathLst>
+          </a:custGeom>
+          <a:noFill/>
+          <a:ln w="34925">
+            <a:solidFill>
+              <a:srgbClr val="00B050"/>
+            </a:solidFill>
+            <a:prstDash val="dash"/>
+            <a:tailEnd type="triangle"/>
+          </a:ln>
+        </p:spPr>
+        <p:style>
+          <a:lnRef idx="2">
+            <a:schemeClr val="accent1">
+              <a:shade val="15000"/>
+            </a:schemeClr>
+          </a:lnRef>
+          <a:fillRef idx="1">
+            <a:schemeClr val="accent1"/>
+          </a:fillRef>
+          <a:effectRef idx="0">
+            <a:schemeClr val="accent1"/>
+          </a:effectRef>
+          <a:fontRef idx="minor">
+            <a:schemeClr val="lt1"/>
+          </a:fontRef>
+        </p:style>
+        <p:txBody>
+          <a:bodyPr rtlCol="0" anchor="ctr"/>
+          <a:lstStyle/>
+          <a:p>
+            <a:pPr algn="ctr"/>
+            <a:endParaRPr lang="en-US"/>
+          </a:p>
+        </p:txBody>
+      </p:sp>
+      <p:sp>
+        <p:nvSpPr>
+          <p:cNvPr id="57" name="Freeform 56">
+            <a:extLst>
+              <a:ext uri="{FF2B5EF4-FFF2-40B4-BE49-F238E27FC236}">
+                <a16:creationId xmlns:a16="http://schemas.microsoft.com/office/drawing/2014/main" id="{CE4D8F49-4621-9D22-CBBF-8CBDFCF6BF20}"/>
+              </a:ext>
+            </a:extLst>
+          </p:cNvPr>
+          <p:cNvSpPr/>
+          <p:nvPr/>
+        </p:nvSpPr>
+        <p:spPr>
+          <a:xfrm flipH="1">
+            <a:off x="29583750" y="1638636"/>
+            <a:ext cx="997627" cy="4128655"/>
+          </a:xfrm>
+          <a:custGeom>
+            <a:avLst/>
+            <a:gdLst>
+              <a:gd name="connsiteX0" fmla="*/ 720536 w 997627"/>
+              <a:gd name="connsiteY0" fmla="*/ 0 h 4128655"/>
+              <a:gd name="connsiteX1" fmla="*/ 748245 w 997627"/>
+              <a:gd name="connsiteY1" fmla="*/ 1468582 h 4128655"/>
+              <a:gd name="connsiteX2" fmla="*/ 99 w 997627"/>
+              <a:gd name="connsiteY2" fmla="*/ 2355273 h 4128655"/>
+              <a:gd name="connsiteX3" fmla="*/ 803663 w 997627"/>
+              <a:gd name="connsiteY3" fmla="*/ 3269673 h 4128655"/>
+              <a:gd name="connsiteX4" fmla="*/ 997627 w 997627"/>
+              <a:gd name="connsiteY4" fmla="*/ 4128655 h 4128655"/>
+            </a:gdLst>
+            <a:ahLst/>
+            <a:cxnLst>
+              <a:cxn ang="0">
+                <a:pos x="connsiteX0" y="connsiteY0"/>
+              </a:cxn>
+              <a:cxn ang="0">
+                <a:pos x="connsiteX1" y="connsiteY1"/>
+              </a:cxn>
+              <a:cxn ang="0">
+                <a:pos x="connsiteX2" y="connsiteY2"/>
+              </a:cxn>
+              <a:cxn ang="0">
+                <a:pos x="connsiteX3" y="connsiteY3"/>
+              </a:cxn>
+              <a:cxn ang="0">
+                <a:pos x="connsiteX4" y="connsiteY4"/>
+              </a:cxn>
+            </a:cxnLst>
+            <a:rect l="l" t="t" r="r" b="b"/>
+            <a:pathLst>
+              <a:path w="997627" h="4128655">
+                <a:moveTo>
+                  <a:pt x="720536" y="0"/>
+                </a:moveTo>
+                <a:cubicBezTo>
+                  <a:pt x="794427" y="538018"/>
+                  <a:pt x="868318" y="1076037"/>
+                  <a:pt x="748245" y="1468582"/>
+                </a:cubicBezTo>
+                <a:cubicBezTo>
+                  <a:pt x="628172" y="1861128"/>
+                  <a:pt x="-9137" y="2055091"/>
+                  <a:pt x="99" y="2355273"/>
+                </a:cubicBezTo>
+                <a:cubicBezTo>
+                  <a:pt x="9335" y="2655455"/>
+                  <a:pt x="637408" y="2974109"/>
+                  <a:pt x="803663" y="3269673"/>
+                </a:cubicBezTo>
+                <a:cubicBezTo>
+                  <a:pt x="969918" y="3565237"/>
+                  <a:pt x="993009" y="3874655"/>
+                  <a:pt x="997627" y="4128655"/>
+                </a:cubicBezTo>
+              </a:path>
+            </a:pathLst>
+          </a:custGeom>
+          <a:noFill/>
+          <a:ln w="34925">
+            <a:solidFill>
+              <a:srgbClr val="00B050"/>
+            </a:solidFill>
+            <a:prstDash val="dash"/>
+            <a:tailEnd type="triangle"/>
+          </a:ln>
+        </p:spPr>
+        <p:style>
+          <a:lnRef idx="2">
+            <a:schemeClr val="accent1">
+              <a:shade val="15000"/>
+            </a:schemeClr>
+          </a:lnRef>
+          <a:fillRef idx="1">
+            <a:schemeClr val="accent1"/>
+          </a:fillRef>
+          <a:effectRef idx="0">
+            <a:schemeClr val="accent1"/>
+          </a:effectRef>
+          <a:fontRef idx="minor">
+            <a:schemeClr val="lt1"/>
+          </a:fontRef>
+        </p:style>
+        <p:txBody>
+          <a:bodyPr rtlCol="0" anchor="ctr"/>
+          <a:lstStyle/>
+          <a:p>
+            <a:pPr algn="ctr"/>
+            <a:endParaRPr lang="en-US"/>
+          </a:p>
+        </p:txBody>
+      </p:sp>
+      <p:sp>
+        <p:nvSpPr>
+          <p:cNvPr id="75" name="Freeform 74">
+            <a:extLst>
+              <a:ext uri="{FF2B5EF4-FFF2-40B4-BE49-F238E27FC236}">
+                <a16:creationId xmlns:a16="http://schemas.microsoft.com/office/drawing/2014/main" id="{C91498FD-9CCA-FACF-2756-45C241BE9163}"/>
+              </a:ext>
+            </a:extLst>
+          </p:cNvPr>
+          <p:cNvSpPr/>
+          <p:nvPr/>
+        </p:nvSpPr>
+        <p:spPr>
+          <a:xfrm>
+            <a:off x="28835287" y="1593410"/>
+            <a:ext cx="545183" cy="2390115"/>
+          </a:xfrm>
+          <a:custGeom>
+            <a:avLst/>
+            <a:gdLst>
+              <a:gd name="connsiteX0" fmla="*/ 543208 w 545183"/>
+              <a:gd name="connsiteY0" fmla="*/ 0 h 2390115"/>
+              <a:gd name="connsiteX1" fmla="*/ 461727 w 545183"/>
+              <a:gd name="connsiteY1" fmla="*/ 1792586 h 2390115"/>
+              <a:gd name="connsiteX2" fmla="*/ 0 w 545183"/>
+              <a:gd name="connsiteY2" fmla="*/ 2390115 h 2390115"/>
+            </a:gdLst>
+            <a:ahLst/>
+            <a:cxnLst>
+              <a:cxn ang="0">
+                <a:pos x="connsiteX0" y="connsiteY0"/>
+              </a:cxn>
+              <a:cxn ang="0">
+                <a:pos x="connsiteX1" y="connsiteY1"/>
+              </a:cxn>
+              <a:cxn ang="0">
+                <a:pos x="connsiteX2" y="connsiteY2"/>
+              </a:cxn>
+            </a:cxnLst>
+            <a:rect l="l" t="t" r="r" b="b"/>
+            <a:pathLst>
+              <a:path w="545183" h="2390115">
+                <a:moveTo>
+                  <a:pt x="543208" y="0"/>
+                </a:moveTo>
+                <a:cubicBezTo>
+                  <a:pt x="547735" y="697117"/>
+                  <a:pt x="552262" y="1394234"/>
+                  <a:pt x="461727" y="1792586"/>
+                </a:cubicBezTo>
+                <a:cubicBezTo>
+                  <a:pt x="371192" y="2190939"/>
+                  <a:pt x="185596" y="2290527"/>
+                  <a:pt x="0" y="2390115"/>
+                </a:cubicBezTo>
+              </a:path>
+            </a:pathLst>
+          </a:custGeom>
+          <a:noFill/>
+          <a:ln w="34925">
+            <a:solidFill>
+              <a:srgbClr val="00B050"/>
+            </a:solidFill>
+            <a:prstDash val="dash"/>
+            <a:tailEnd type="triangle"/>
+          </a:ln>
+        </p:spPr>
+        <p:style>
+          <a:lnRef idx="2">
+            <a:schemeClr val="accent1">
+              <a:shade val="15000"/>
+            </a:schemeClr>
+          </a:lnRef>
+          <a:fillRef idx="1">
+            <a:schemeClr val="accent1"/>
+          </a:fillRef>
+          <a:effectRef idx="0">
+            <a:schemeClr val="accent1"/>
+          </a:effectRef>
+          <a:fontRef idx="minor">
+            <a:schemeClr val="lt1"/>
+          </a:fontRef>
+        </p:style>
+        <p:txBody>
+          <a:bodyPr rtlCol="0" anchor="ctr"/>
+          <a:lstStyle/>
+          <a:p>
+            <a:pPr algn="ctr"/>
+            <a:endParaRPr lang="en-US"/>
           </a:p>
         </p:txBody>
       </p:sp>

</xml_diff>

<commit_message>
clean up wording etc.
</commit_message>
<xml_diff>
--- a/latex/popl2025/flow.pptx
+++ b/latex/popl2025/flow.pptx
@@ -7997,7 +7997,7 @@
         </p:blipFill>
         <p:spPr>
           <a:xfrm rot="5400000">
-            <a:off x="26554750" y="2452005"/>
+            <a:off x="26554750" y="2488479"/>
             <a:ext cx="4971364" cy="1915842"/>
           </a:xfrm>
           <a:prstGeom prst="rect">
@@ -8019,7 +8019,7 @@
         </p:nvSpPr>
         <p:spPr>
           <a:xfrm>
-            <a:off x="28636277" y="2629055"/>
+            <a:off x="28636277" y="2665529"/>
             <a:ext cx="322524" cy="369332"/>
           </a:xfrm>
           <a:prstGeom prst="rect">
@@ -8058,7 +8058,7 @@
         </p:nvSpPr>
         <p:spPr>
           <a:xfrm>
-            <a:off x="28419505" y="3248877"/>
+            <a:off x="28419505" y="3285351"/>
             <a:ext cx="322524" cy="369332"/>
           </a:xfrm>
           <a:prstGeom prst="rect">
@@ -8097,7 +8097,7 @@
         </p:nvSpPr>
         <p:spPr>
           <a:xfrm>
-            <a:off x="29327607" y="3233911"/>
+            <a:off x="29327607" y="3270385"/>
             <a:ext cx="322524" cy="369332"/>
           </a:xfrm>
           <a:prstGeom prst="rect">
@@ -8136,7 +8136,7 @@
         </p:nvSpPr>
         <p:spPr>
           <a:xfrm>
-            <a:off x="29403177" y="4368406"/>
+            <a:off x="29403177" y="4404880"/>
             <a:ext cx="322524" cy="369332"/>
           </a:xfrm>
           <a:prstGeom prst="rect">
@@ -8175,7 +8175,7 @@
         </p:nvSpPr>
         <p:spPr>
           <a:xfrm>
-            <a:off x="28353096" y="4368406"/>
+            <a:off x="28353096" y="4404880"/>
             <a:ext cx="322524" cy="369332"/>
           </a:xfrm>
           <a:prstGeom prst="rect">
@@ -8214,7 +8214,7 @@
         </p:nvSpPr>
         <p:spPr>
           <a:xfrm>
-            <a:off x="29085914" y="5001653"/>
+            <a:off x="29085914" y="5038127"/>
             <a:ext cx="322524" cy="369332"/>
           </a:xfrm>
           <a:prstGeom prst="rect">
@@ -8355,7 +8355,7 @@
         </p:nvSpPr>
         <p:spPr>
           <a:xfrm>
-            <a:off x="27533407" y="1650188"/>
+            <a:off x="27533407" y="1686662"/>
             <a:ext cx="997627" cy="4128655"/>
           </a:xfrm>
           <a:custGeom>
@@ -8467,7 +8467,7 @@
         </p:nvSpPr>
         <p:spPr>
           <a:xfrm flipH="1">
-            <a:off x="29583750" y="1638636"/>
+            <a:off x="29583750" y="1681460"/>
             <a:ext cx="997627" cy="4128655"/>
           </a:xfrm>
           <a:custGeom>
@@ -8579,7 +8579,7 @@
         </p:nvSpPr>
         <p:spPr>
           <a:xfrm>
-            <a:off x="28835287" y="1593410"/>
+            <a:off x="28835287" y="1629884"/>
             <a:ext cx="545183" cy="2390115"/>
           </a:xfrm>
           <a:custGeom>

</xml_diff>